<commit_message>
added somethings to the pptx
</commit_message>
<xml_diff>
--- a/Assignment1/Docs/Pres.pptx
+++ b/Assignment1/Docs/Pres.pptx
@@ -8,6 +8,8 @@
   <p:sldIdLst>
     <p:sldId id="256" r:id="rId3"/>
     <p:sldId id="257" r:id="rId4"/>
+    <p:sldId id="258" r:id="rId5"/>
+    <p:sldId id="259" r:id="rId6"/>
   </p:sldIdLst>
   <p:sldSz cx="12192000" cy="6858000"/>
   <p:notesSz cx="6858000" cy="9144000"/>
@@ -106,6 +108,11 @@
       </a:defRPr>
     </a:lvl9pPr>
   </p:defaultTextStyle>
+  <p:extLst>
+    <p:ext uri="{EFAFB233-063F-42B5-8137-9DF3F51BA10A}">
+      <p15:sldGuideLst xmlns:p15="http://schemas.microsoft.com/office/powerpoint/2012/main"/>
+    </p:ext>
+  </p:extLst>
 </p:presentation>
 </file>
 
@@ -151,10 +158,9 @@
           </a:lstStyle>
           <a:p>
             <a:r>
-              <a:rPr lang="he-IL" smtClean="0"/>
+              <a:rPr lang="he-IL"/>
               <a:t>לחץ כדי לערוך סגנון כותרת של תבנית בסיס</a:t>
             </a:r>
-            <a:endParaRPr lang="he-IL"/>
           </a:p>
         </p:txBody>
       </p:sp>
@@ -216,10 +222,9 @@
           </a:lstStyle>
           <a:p>
             <a:r>
-              <a:rPr lang="he-IL" smtClean="0"/>
+              <a:rPr lang="he-IL"/>
               <a:t>לחץ כדי לערוך סגנון כותרת משנה של תבנית בסיס</a:t>
             </a:r>
-            <a:endParaRPr lang="he-IL"/>
           </a:p>
         </p:txBody>
       </p:sp>
@@ -240,7 +245,7 @@
           <a:p>
             <a:fld id="{022F9609-C2A5-48F5-93C6-285E682E4BDE}" type="datetimeFigureOut">
               <a:rPr lang="he-IL" smtClean="0"/>
-              <a:t>כ"ה/אדר ב/תשע"ט</a:t>
+              <a:t>כ'/ניסן/תשע"ט</a:t>
             </a:fld>
             <a:endParaRPr lang="he-IL"/>
           </a:p>
@@ -334,10 +339,9 @@
           <a:lstStyle/>
           <a:p>
             <a:r>
-              <a:rPr lang="he-IL" smtClean="0"/>
+              <a:rPr lang="he-IL"/>
               <a:t>לחץ כדי לערוך סגנון כותרת של תבנית בסיס</a:t>
             </a:r>
-            <a:endParaRPr lang="he-IL"/>
           </a:p>
         </p:txBody>
       </p:sp>
@@ -358,38 +362,37 @@
           <a:p>
             <a:pPr lvl="0"/>
             <a:r>
-              <a:rPr lang="he-IL" smtClean="0"/>
+              <a:rPr lang="he-IL"/>
               <a:t>לחץ כדי לערוך סגנונות טקסט של תבנית בסיס</a:t>
             </a:r>
           </a:p>
           <a:p>
             <a:pPr lvl="1"/>
             <a:r>
-              <a:rPr lang="he-IL" smtClean="0"/>
+              <a:rPr lang="he-IL"/>
               <a:t>רמה שנייה</a:t>
             </a:r>
           </a:p>
           <a:p>
             <a:pPr lvl="2"/>
             <a:r>
-              <a:rPr lang="he-IL" smtClean="0"/>
+              <a:rPr lang="he-IL"/>
               <a:t>רמה שלישית</a:t>
             </a:r>
           </a:p>
           <a:p>
             <a:pPr lvl="3"/>
             <a:r>
-              <a:rPr lang="he-IL" smtClean="0"/>
+              <a:rPr lang="he-IL"/>
               <a:t>רמה רביעית</a:t>
             </a:r>
           </a:p>
           <a:p>
             <a:pPr lvl="4"/>
             <a:r>
-              <a:rPr lang="he-IL" smtClean="0"/>
+              <a:rPr lang="he-IL"/>
               <a:t>רמה חמישית</a:t>
             </a:r>
-            <a:endParaRPr lang="he-IL"/>
           </a:p>
         </p:txBody>
       </p:sp>
@@ -410,7 +413,7 @@
           <a:p>
             <a:fld id="{022F9609-C2A5-48F5-93C6-285E682E4BDE}" type="datetimeFigureOut">
               <a:rPr lang="he-IL" smtClean="0"/>
-              <a:t>כ"ה/אדר ב/תשע"ט</a:t>
+              <a:t>כ'/ניסן/תשע"ט</a:t>
             </a:fld>
             <a:endParaRPr lang="he-IL"/>
           </a:p>
@@ -509,10 +512,9 @@
           <a:lstStyle/>
           <a:p>
             <a:r>
-              <a:rPr lang="he-IL" smtClean="0"/>
+              <a:rPr lang="he-IL"/>
               <a:t>לחץ כדי לערוך סגנון כותרת של תבנית בסיס</a:t>
             </a:r>
-            <a:endParaRPr lang="he-IL"/>
           </a:p>
         </p:txBody>
       </p:sp>
@@ -538,38 +540,37 @@
           <a:p>
             <a:pPr lvl="0"/>
             <a:r>
-              <a:rPr lang="he-IL" smtClean="0"/>
+              <a:rPr lang="he-IL"/>
               <a:t>לחץ כדי לערוך סגנונות טקסט של תבנית בסיס</a:t>
             </a:r>
           </a:p>
           <a:p>
             <a:pPr lvl="1"/>
             <a:r>
-              <a:rPr lang="he-IL" smtClean="0"/>
+              <a:rPr lang="he-IL"/>
               <a:t>רמה שנייה</a:t>
             </a:r>
           </a:p>
           <a:p>
             <a:pPr lvl="2"/>
             <a:r>
-              <a:rPr lang="he-IL" smtClean="0"/>
+              <a:rPr lang="he-IL"/>
               <a:t>רמה שלישית</a:t>
             </a:r>
           </a:p>
           <a:p>
             <a:pPr lvl="3"/>
             <a:r>
-              <a:rPr lang="he-IL" smtClean="0"/>
+              <a:rPr lang="he-IL"/>
               <a:t>רמה רביעית</a:t>
             </a:r>
           </a:p>
           <a:p>
             <a:pPr lvl="4"/>
             <a:r>
-              <a:rPr lang="he-IL" smtClean="0"/>
+              <a:rPr lang="he-IL"/>
               <a:t>רמה חמישית</a:t>
             </a:r>
-            <a:endParaRPr lang="he-IL"/>
           </a:p>
         </p:txBody>
       </p:sp>
@@ -590,7 +591,7 @@
           <a:p>
             <a:fld id="{022F9609-C2A5-48F5-93C6-285E682E4BDE}" type="datetimeFigureOut">
               <a:rPr lang="he-IL" smtClean="0"/>
-              <a:t>כ"ה/אדר ב/תשע"ט</a:t>
+              <a:t>כ'/ניסן/תשע"ט</a:t>
             </a:fld>
             <a:endParaRPr lang="he-IL"/>
           </a:p>
@@ -673,7 +674,7 @@
           <p:cNvPr id="2" name="Title 1">
             <a:extLst>
               <a:ext uri="{FF2B5EF4-FFF2-40B4-BE49-F238E27FC236}">
-                <a16:creationId xmlns:a16="http://schemas.microsoft.com/office/drawing/2014/main" xmlns="" id="{91B14E59-9116-448A-AB39-5759A300CDF0}"/>
+                <a16:creationId xmlns:a16="http://schemas.microsoft.com/office/drawing/2014/main" id="{91B14E59-9116-448A-AB39-5759A300CDF0}"/>
               </a:ext>
             </a:extLst>
           </p:cNvPr>
@@ -710,7 +711,7 @@
           <p:cNvPr id="3" name="Subtitle 2">
             <a:extLst>
               <a:ext uri="{FF2B5EF4-FFF2-40B4-BE49-F238E27FC236}">
-                <a16:creationId xmlns:a16="http://schemas.microsoft.com/office/drawing/2014/main" xmlns="" id="{0F28AF64-631A-4532-B3BE-F161FBAC98ED}"/>
+                <a16:creationId xmlns:a16="http://schemas.microsoft.com/office/drawing/2014/main" id="{0F28AF64-631A-4532-B3BE-F161FBAC98ED}"/>
               </a:ext>
             </a:extLst>
           </p:cNvPr>
@@ -780,7 +781,7 @@
           <p:cNvPr id="4" name="Date Placeholder 3">
             <a:extLst>
               <a:ext uri="{FF2B5EF4-FFF2-40B4-BE49-F238E27FC236}">
-                <a16:creationId xmlns:a16="http://schemas.microsoft.com/office/drawing/2014/main" xmlns="" id="{23B97038-95FB-4466-904A-1991959FE93E}"/>
+                <a16:creationId xmlns:a16="http://schemas.microsoft.com/office/drawing/2014/main" id="{23B97038-95FB-4466-904A-1991959FE93E}"/>
               </a:ext>
             </a:extLst>
           </p:cNvPr>
@@ -805,7 +806,7 @@
                 </a:solidFill>
               </a:rPr>
               <a:pPr/>
-              <a:t>4/1/2019</a:t>
+              <a:t>4/25/2019</a:t>
             </a:fld>
             <a:endParaRPr lang="en-US">
               <a:solidFill>
@@ -822,7 +823,7 @@
           <p:cNvPr id="5" name="Footer Placeholder 4">
             <a:extLst>
               <a:ext uri="{FF2B5EF4-FFF2-40B4-BE49-F238E27FC236}">
-                <a16:creationId xmlns:a16="http://schemas.microsoft.com/office/drawing/2014/main" xmlns="" id="{BBDEF073-13A5-4905-B55E-CB834DF0EF4B}"/>
+                <a16:creationId xmlns:a16="http://schemas.microsoft.com/office/drawing/2014/main" id="{BBDEF073-13A5-4905-B55E-CB834DF0EF4B}"/>
               </a:ext>
             </a:extLst>
           </p:cNvPr>
@@ -853,7 +854,7 @@
           <p:cNvPr id="6" name="Slide Number Placeholder 5">
             <a:extLst>
               <a:ext uri="{FF2B5EF4-FFF2-40B4-BE49-F238E27FC236}">
-                <a16:creationId xmlns:a16="http://schemas.microsoft.com/office/drawing/2014/main" xmlns="" id="{154B66DC-8267-4D79-835C-6356A47CEFBE}"/>
+                <a16:creationId xmlns:a16="http://schemas.microsoft.com/office/drawing/2014/main" id="{154B66DC-8267-4D79-835C-6356A47CEFBE}"/>
               </a:ext>
             </a:extLst>
           </p:cNvPr>
@@ -925,7 +926,7 @@
           <p:cNvPr id="2" name="Title 1">
             <a:extLst>
               <a:ext uri="{FF2B5EF4-FFF2-40B4-BE49-F238E27FC236}">
-                <a16:creationId xmlns:a16="http://schemas.microsoft.com/office/drawing/2014/main" xmlns="" id="{73FD068C-F7EE-4223-AB4A-99F52059904F}"/>
+                <a16:creationId xmlns:a16="http://schemas.microsoft.com/office/drawing/2014/main" id="{73FD068C-F7EE-4223-AB4A-99F52059904F}"/>
               </a:ext>
             </a:extLst>
           </p:cNvPr>
@@ -960,7 +961,7 @@
           <p:cNvPr id="3" name="Content Placeholder 2">
             <a:extLst>
               <a:ext uri="{FF2B5EF4-FFF2-40B4-BE49-F238E27FC236}">
-                <a16:creationId xmlns:a16="http://schemas.microsoft.com/office/drawing/2014/main" xmlns="" id="{D5EE8561-9007-4C80-9B68-825CF342C3F8}"/>
+                <a16:creationId xmlns:a16="http://schemas.microsoft.com/office/drawing/2014/main" id="{D5EE8561-9007-4C80-9B68-825CF342C3F8}"/>
               </a:ext>
             </a:extLst>
           </p:cNvPr>
@@ -1048,7 +1049,7 @@
           <p:cNvPr id="4" name="Date Placeholder 3">
             <a:extLst>
               <a:ext uri="{FF2B5EF4-FFF2-40B4-BE49-F238E27FC236}">
-                <a16:creationId xmlns:a16="http://schemas.microsoft.com/office/drawing/2014/main" xmlns="" id="{9668831F-5C4A-4E1C-B123-672DF2C04597}"/>
+                <a16:creationId xmlns:a16="http://schemas.microsoft.com/office/drawing/2014/main" id="{9668831F-5C4A-4E1C-B123-672DF2C04597}"/>
               </a:ext>
             </a:extLst>
           </p:cNvPr>
@@ -1073,7 +1074,7 @@
                 </a:solidFill>
               </a:rPr>
               <a:pPr/>
-              <a:t>4/1/2019</a:t>
+              <a:t>4/25/2019</a:t>
             </a:fld>
             <a:endParaRPr lang="en-US">
               <a:solidFill>
@@ -1090,7 +1091,7 @@
           <p:cNvPr id="5" name="Footer Placeholder 4">
             <a:extLst>
               <a:ext uri="{FF2B5EF4-FFF2-40B4-BE49-F238E27FC236}">
-                <a16:creationId xmlns:a16="http://schemas.microsoft.com/office/drawing/2014/main" xmlns="" id="{B8242338-6613-4DF3-8041-424A18C3B633}"/>
+                <a16:creationId xmlns:a16="http://schemas.microsoft.com/office/drawing/2014/main" id="{B8242338-6613-4DF3-8041-424A18C3B633}"/>
               </a:ext>
             </a:extLst>
           </p:cNvPr>
@@ -1121,7 +1122,7 @@
           <p:cNvPr id="6" name="Slide Number Placeholder 5">
             <a:extLst>
               <a:ext uri="{FF2B5EF4-FFF2-40B4-BE49-F238E27FC236}">
-                <a16:creationId xmlns:a16="http://schemas.microsoft.com/office/drawing/2014/main" xmlns="" id="{6EEECFA5-F058-44F8-8E94-D91191FEB659}"/>
+                <a16:creationId xmlns:a16="http://schemas.microsoft.com/office/drawing/2014/main" id="{6EEECFA5-F058-44F8-8E94-D91191FEB659}"/>
               </a:ext>
             </a:extLst>
           </p:cNvPr>
@@ -1202,7 +1203,7 @@
           <p:cNvPr id="2" name="Title 1">
             <a:extLst>
               <a:ext uri="{FF2B5EF4-FFF2-40B4-BE49-F238E27FC236}">
-                <a16:creationId xmlns:a16="http://schemas.microsoft.com/office/drawing/2014/main" xmlns="" id="{44BC6B70-6030-4A02-8339-1313A1C09CF0}"/>
+                <a16:creationId xmlns:a16="http://schemas.microsoft.com/office/drawing/2014/main" id="{44BC6B70-6030-4A02-8339-1313A1C09CF0}"/>
               </a:ext>
             </a:extLst>
           </p:cNvPr>
@@ -1239,7 +1240,7 @@
           <p:cNvPr id="3" name="Text Placeholder 2">
             <a:extLst>
               <a:ext uri="{FF2B5EF4-FFF2-40B4-BE49-F238E27FC236}">
-                <a16:creationId xmlns:a16="http://schemas.microsoft.com/office/drawing/2014/main" xmlns="" id="{562DA254-EBD7-4C47-ADA0-95A83BF42A5F}"/>
+                <a16:creationId xmlns:a16="http://schemas.microsoft.com/office/drawing/2014/main" id="{562DA254-EBD7-4C47-ADA0-95A83BF42A5F}"/>
               </a:ext>
             </a:extLst>
           </p:cNvPr>
@@ -1364,7 +1365,7 @@
           <p:cNvPr id="4" name="Date Placeholder 3">
             <a:extLst>
               <a:ext uri="{FF2B5EF4-FFF2-40B4-BE49-F238E27FC236}">
-                <a16:creationId xmlns:a16="http://schemas.microsoft.com/office/drawing/2014/main" xmlns="" id="{8F100458-42D6-4712-BC38-19268468C5EA}"/>
+                <a16:creationId xmlns:a16="http://schemas.microsoft.com/office/drawing/2014/main" id="{8F100458-42D6-4712-BC38-19268468C5EA}"/>
               </a:ext>
             </a:extLst>
           </p:cNvPr>
@@ -1389,7 +1390,7 @@
                 </a:solidFill>
               </a:rPr>
               <a:pPr/>
-              <a:t>4/1/2019</a:t>
+              <a:t>4/25/2019</a:t>
             </a:fld>
             <a:endParaRPr lang="en-US">
               <a:solidFill>
@@ -1406,7 +1407,7 @@
           <p:cNvPr id="5" name="Footer Placeholder 4">
             <a:extLst>
               <a:ext uri="{FF2B5EF4-FFF2-40B4-BE49-F238E27FC236}">
-                <a16:creationId xmlns:a16="http://schemas.microsoft.com/office/drawing/2014/main" xmlns="" id="{54A0E88B-5937-4311-8A63-1F3219151C93}"/>
+                <a16:creationId xmlns:a16="http://schemas.microsoft.com/office/drawing/2014/main" id="{54A0E88B-5937-4311-8A63-1F3219151C93}"/>
               </a:ext>
             </a:extLst>
           </p:cNvPr>
@@ -1437,7 +1438,7 @@
           <p:cNvPr id="6" name="Slide Number Placeholder 5">
             <a:extLst>
               <a:ext uri="{FF2B5EF4-FFF2-40B4-BE49-F238E27FC236}">
-                <a16:creationId xmlns:a16="http://schemas.microsoft.com/office/drawing/2014/main" xmlns="" id="{F3E53272-2DCC-4129-B048-699393AABF52}"/>
+                <a16:creationId xmlns:a16="http://schemas.microsoft.com/office/drawing/2014/main" id="{F3E53272-2DCC-4129-B048-699393AABF52}"/>
               </a:ext>
             </a:extLst>
           </p:cNvPr>
@@ -1509,7 +1510,7 @@
           <p:cNvPr id="2" name="Title 1">
             <a:extLst>
               <a:ext uri="{FF2B5EF4-FFF2-40B4-BE49-F238E27FC236}">
-                <a16:creationId xmlns:a16="http://schemas.microsoft.com/office/drawing/2014/main" xmlns="" id="{E2322736-9BE0-4B91-B7B6-1CF0030F0A73}"/>
+                <a16:creationId xmlns:a16="http://schemas.microsoft.com/office/drawing/2014/main" id="{E2322736-9BE0-4B91-B7B6-1CF0030F0A73}"/>
               </a:ext>
             </a:extLst>
           </p:cNvPr>
@@ -1537,7 +1538,7 @@
           <p:cNvPr id="3" name="Content Placeholder 2">
             <a:extLst>
               <a:ext uri="{FF2B5EF4-FFF2-40B4-BE49-F238E27FC236}">
-                <a16:creationId xmlns:a16="http://schemas.microsoft.com/office/drawing/2014/main" xmlns="" id="{3EE2AE59-AF60-44B4-A4C6-4F0AFA7D0A49}"/>
+                <a16:creationId xmlns:a16="http://schemas.microsoft.com/office/drawing/2014/main" id="{3EE2AE59-AF60-44B4-A4C6-4F0AFA7D0A49}"/>
               </a:ext>
             </a:extLst>
           </p:cNvPr>
@@ -1599,7 +1600,7 @@
           <p:cNvPr id="4" name="Content Placeholder 3">
             <a:extLst>
               <a:ext uri="{FF2B5EF4-FFF2-40B4-BE49-F238E27FC236}">
-                <a16:creationId xmlns:a16="http://schemas.microsoft.com/office/drawing/2014/main" xmlns="" id="{204C30C6-7561-4109-9FB8-9028F8DC648D}"/>
+                <a16:creationId xmlns:a16="http://schemas.microsoft.com/office/drawing/2014/main" id="{204C30C6-7561-4109-9FB8-9028F8DC648D}"/>
               </a:ext>
             </a:extLst>
           </p:cNvPr>
@@ -1661,7 +1662,7 @@
           <p:cNvPr id="5" name="Date Placeholder 4">
             <a:extLst>
               <a:ext uri="{FF2B5EF4-FFF2-40B4-BE49-F238E27FC236}">
-                <a16:creationId xmlns:a16="http://schemas.microsoft.com/office/drawing/2014/main" xmlns="" id="{A4970155-E6C7-475A-BAA9-832978C6F1BE}"/>
+                <a16:creationId xmlns:a16="http://schemas.microsoft.com/office/drawing/2014/main" id="{A4970155-E6C7-475A-BAA9-832978C6F1BE}"/>
               </a:ext>
             </a:extLst>
           </p:cNvPr>
@@ -1686,7 +1687,7 @@
                 </a:solidFill>
               </a:rPr>
               <a:pPr/>
-              <a:t>4/1/2019</a:t>
+              <a:t>4/25/2019</a:t>
             </a:fld>
             <a:endParaRPr lang="en-US">
               <a:solidFill>
@@ -1703,7 +1704,7 @@
           <p:cNvPr id="6" name="Footer Placeholder 5">
             <a:extLst>
               <a:ext uri="{FF2B5EF4-FFF2-40B4-BE49-F238E27FC236}">
-                <a16:creationId xmlns:a16="http://schemas.microsoft.com/office/drawing/2014/main" xmlns="" id="{4A5D58C2-5148-446A-8287-F2385FB6FD02}"/>
+                <a16:creationId xmlns:a16="http://schemas.microsoft.com/office/drawing/2014/main" id="{4A5D58C2-5148-446A-8287-F2385FB6FD02}"/>
               </a:ext>
             </a:extLst>
           </p:cNvPr>
@@ -1734,7 +1735,7 @@
           <p:cNvPr id="7" name="Slide Number Placeholder 6">
             <a:extLst>
               <a:ext uri="{FF2B5EF4-FFF2-40B4-BE49-F238E27FC236}">
-                <a16:creationId xmlns:a16="http://schemas.microsoft.com/office/drawing/2014/main" xmlns="" id="{8D54D93B-F417-4064-8F03-27A67FDC2503}"/>
+                <a16:creationId xmlns:a16="http://schemas.microsoft.com/office/drawing/2014/main" id="{8D54D93B-F417-4064-8F03-27A67FDC2503}"/>
               </a:ext>
             </a:extLst>
           </p:cNvPr>
@@ -1806,7 +1807,7 @@
           <p:cNvPr id="2" name="Title 1">
             <a:extLst>
               <a:ext uri="{FF2B5EF4-FFF2-40B4-BE49-F238E27FC236}">
-                <a16:creationId xmlns:a16="http://schemas.microsoft.com/office/drawing/2014/main" xmlns="" id="{EF0BC735-A5BC-4CBD-8AA2-C3FD2072CD8A}"/>
+                <a16:creationId xmlns:a16="http://schemas.microsoft.com/office/drawing/2014/main" id="{EF0BC735-A5BC-4CBD-8AA2-C3FD2072CD8A}"/>
               </a:ext>
             </a:extLst>
           </p:cNvPr>
@@ -1839,7 +1840,7 @@
           <p:cNvPr id="3" name="Text Placeholder 2">
             <a:extLst>
               <a:ext uri="{FF2B5EF4-FFF2-40B4-BE49-F238E27FC236}">
-                <a16:creationId xmlns:a16="http://schemas.microsoft.com/office/drawing/2014/main" xmlns="" id="{22CE085A-F316-4FE2-BE9E-721E8D7938C5}"/>
+                <a16:creationId xmlns:a16="http://schemas.microsoft.com/office/drawing/2014/main" id="{22CE085A-F316-4FE2-BE9E-721E8D7938C5}"/>
               </a:ext>
             </a:extLst>
           </p:cNvPr>
@@ -1910,7 +1911,7 @@
           <p:cNvPr id="4" name="Content Placeholder 3">
             <a:extLst>
               <a:ext uri="{FF2B5EF4-FFF2-40B4-BE49-F238E27FC236}">
-                <a16:creationId xmlns:a16="http://schemas.microsoft.com/office/drawing/2014/main" xmlns="" id="{879B4ACE-A8E0-424E-B601-426E142199D2}"/>
+                <a16:creationId xmlns:a16="http://schemas.microsoft.com/office/drawing/2014/main" id="{879B4ACE-A8E0-424E-B601-426E142199D2}"/>
               </a:ext>
             </a:extLst>
           </p:cNvPr>
@@ -1972,7 +1973,7 @@
           <p:cNvPr id="5" name="Text Placeholder 4">
             <a:extLst>
               <a:ext uri="{FF2B5EF4-FFF2-40B4-BE49-F238E27FC236}">
-                <a16:creationId xmlns:a16="http://schemas.microsoft.com/office/drawing/2014/main" xmlns="" id="{9F5A7764-CE69-40C9-9C9F-DDBE79DE62C5}"/>
+                <a16:creationId xmlns:a16="http://schemas.microsoft.com/office/drawing/2014/main" id="{9F5A7764-CE69-40C9-9C9F-DDBE79DE62C5}"/>
               </a:ext>
             </a:extLst>
           </p:cNvPr>
@@ -2043,7 +2044,7 @@
           <p:cNvPr id="6" name="Content Placeholder 5">
             <a:extLst>
               <a:ext uri="{FF2B5EF4-FFF2-40B4-BE49-F238E27FC236}">
-                <a16:creationId xmlns:a16="http://schemas.microsoft.com/office/drawing/2014/main" xmlns="" id="{832306EA-4BEA-4383-8049-FFA1C1CFE579}"/>
+                <a16:creationId xmlns:a16="http://schemas.microsoft.com/office/drawing/2014/main" id="{832306EA-4BEA-4383-8049-FFA1C1CFE579}"/>
               </a:ext>
             </a:extLst>
           </p:cNvPr>
@@ -2105,7 +2106,7 @@
           <p:cNvPr id="7" name="Date Placeholder 6">
             <a:extLst>
               <a:ext uri="{FF2B5EF4-FFF2-40B4-BE49-F238E27FC236}">
-                <a16:creationId xmlns:a16="http://schemas.microsoft.com/office/drawing/2014/main" xmlns="" id="{CE1681C7-40D8-4CD8-9F0D-3E1C90335AB8}"/>
+                <a16:creationId xmlns:a16="http://schemas.microsoft.com/office/drawing/2014/main" id="{CE1681C7-40D8-4CD8-9F0D-3E1C90335AB8}"/>
               </a:ext>
             </a:extLst>
           </p:cNvPr>
@@ -2130,7 +2131,7 @@
                 </a:solidFill>
               </a:rPr>
               <a:pPr/>
-              <a:t>4/1/2019</a:t>
+              <a:t>4/25/2019</a:t>
             </a:fld>
             <a:endParaRPr lang="en-US">
               <a:solidFill>
@@ -2147,7 +2148,7 @@
           <p:cNvPr id="8" name="Footer Placeholder 7">
             <a:extLst>
               <a:ext uri="{FF2B5EF4-FFF2-40B4-BE49-F238E27FC236}">
-                <a16:creationId xmlns:a16="http://schemas.microsoft.com/office/drawing/2014/main" xmlns="" id="{58D9F56E-ECB5-4FF7-86BC-F8CEB3129B54}"/>
+                <a16:creationId xmlns:a16="http://schemas.microsoft.com/office/drawing/2014/main" id="{58D9F56E-ECB5-4FF7-86BC-F8CEB3129B54}"/>
               </a:ext>
             </a:extLst>
           </p:cNvPr>
@@ -2178,7 +2179,7 @@
           <p:cNvPr id="9" name="Slide Number Placeholder 8">
             <a:extLst>
               <a:ext uri="{FF2B5EF4-FFF2-40B4-BE49-F238E27FC236}">
-                <a16:creationId xmlns:a16="http://schemas.microsoft.com/office/drawing/2014/main" xmlns="" id="{6F235733-CC02-4BD5-884B-7B055FB7DA09}"/>
+                <a16:creationId xmlns:a16="http://schemas.microsoft.com/office/drawing/2014/main" id="{6F235733-CC02-4BD5-884B-7B055FB7DA09}"/>
               </a:ext>
             </a:extLst>
           </p:cNvPr>
@@ -2250,7 +2251,7 @@
           <p:cNvPr id="2" name="Title 1">
             <a:extLst>
               <a:ext uri="{FF2B5EF4-FFF2-40B4-BE49-F238E27FC236}">
-                <a16:creationId xmlns:a16="http://schemas.microsoft.com/office/drawing/2014/main" xmlns="" id="{83053691-D2A5-4319-87D6-4E410350839B}"/>
+                <a16:creationId xmlns:a16="http://schemas.microsoft.com/office/drawing/2014/main" id="{83053691-D2A5-4319-87D6-4E410350839B}"/>
               </a:ext>
             </a:extLst>
           </p:cNvPr>
@@ -2278,7 +2279,7 @@
           <p:cNvPr id="3" name="Date Placeholder 2">
             <a:extLst>
               <a:ext uri="{FF2B5EF4-FFF2-40B4-BE49-F238E27FC236}">
-                <a16:creationId xmlns:a16="http://schemas.microsoft.com/office/drawing/2014/main" xmlns="" id="{87B55BA1-4E8F-49FA-980F-76ACACDB7CEF}"/>
+                <a16:creationId xmlns:a16="http://schemas.microsoft.com/office/drawing/2014/main" id="{87B55BA1-4E8F-49FA-980F-76ACACDB7CEF}"/>
               </a:ext>
             </a:extLst>
           </p:cNvPr>
@@ -2303,7 +2304,7 @@
                 </a:solidFill>
               </a:rPr>
               <a:pPr/>
-              <a:t>4/1/2019</a:t>
+              <a:t>4/25/2019</a:t>
             </a:fld>
             <a:endParaRPr lang="en-US">
               <a:solidFill>
@@ -2320,7 +2321,7 @@
           <p:cNvPr id="4" name="Footer Placeholder 3">
             <a:extLst>
               <a:ext uri="{FF2B5EF4-FFF2-40B4-BE49-F238E27FC236}">
-                <a16:creationId xmlns:a16="http://schemas.microsoft.com/office/drawing/2014/main" xmlns="" id="{5A1DA852-C59A-425D-A89E-70DEA50A280D}"/>
+                <a16:creationId xmlns:a16="http://schemas.microsoft.com/office/drawing/2014/main" id="{5A1DA852-C59A-425D-A89E-70DEA50A280D}"/>
               </a:ext>
             </a:extLst>
           </p:cNvPr>
@@ -2351,7 +2352,7 @@
           <p:cNvPr id="5" name="Slide Number Placeholder 4">
             <a:extLst>
               <a:ext uri="{FF2B5EF4-FFF2-40B4-BE49-F238E27FC236}">
-                <a16:creationId xmlns:a16="http://schemas.microsoft.com/office/drawing/2014/main" xmlns="" id="{2B82194B-A78C-4854-AE8B-1C255927CC82}"/>
+                <a16:creationId xmlns:a16="http://schemas.microsoft.com/office/drawing/2014/main" id="{2B82194B-A78C-4854-AE8B-1C255927CC82}"/>
               </a:ext>
             </a:extLst>
           </p:cNvPr>
@@ -2423,7 +2424,7 @@
           <p:cNvPr id="2" name="Date Placeholder 1">
             <a:extLst>
               <a:ext uri="{FF2B5EF4-FFF2-40B4-BE49-F238E27FC236}">
-                <a16:creationId xmlns:a16="http://schemas.microsoft.com/office/drawing/2014/main" xmlns="" id="{AA2CB4BB-6E38-4306-8996-87A89F8682BB}"/>
+                <a16:creationId xmlns:a16="http://schemas.microsoft.com/office/drawing/2014/main" id="{AA2CB4BB-6E38-4306-8996-87A89F8682BB}"/>
               </a:ext>
             </a:extLst>
           </p:cNvPr>
@@ -2448,7 +2449,7 @@
                 </a:solidFill>
               </a:rPr>
               <a:pPr/>
-              <a:t>4/1/2019</a:t>
+              <a:t>4/25/2019</a:t>
             </a:fld>
             <a:endParaRPr lang="en-US">
               <a:solidFill>
@@ -2465,7 +2466,7 @@
           <p:cNvPr id="3" name="Footer Placeholder 2">
             <a:extLst>
               <a:ext uri="{FF2B5EF4-FFF2-40B4-BE49-F238E27FC236}">
-                <a16:creationId xmlns:a16="http://schemas.microsoft.com/office/drawing/2014/main" xmlns="" id="{CF2C5905-1D8F-49AE-A960-7AB5B09AF90D}"/>
+                <a16:creationId xmlns:a16="http://schemas.microsoft.com/office/drawing/2014/main" id="{CF2C5905-1D8F-49AE-A960-7AB5B09AF90D}"/>
               </a:ext>
             </a:extLst>
           </p:cNvPr>
@@ -2496,7 +2497,7 @@
           <p:cNvPr id="4" name="Slide Number Placeholder 3">
             <a:extLst>
               <a:ext uri="{FF2B5EF4-FFF2-40B4-BE49-F238E27FC236}">
-                <a16:creationId xmlns:a16="http://schemas.microsoft.com/office/drawing/2014/main" xmlns="" id="{F58D39D8-6AB0-4D4C-A893-41877DF84D92}"/>
+                <a16:creationId xmlns:a16="http://schemas.microsoft.com/office/drawing/2014/main" id="{F58D39D8-6AB0-4D4C-A893-41877DF84D92}"/>
               </a:ext>
             </a:extLst>
           </p:cNvPr>
@@ -2568,7 +2569,7 @@
           <p:cNvPr id="2" name="Title 1">
             <a:extLst>
               <a:ext uri="{FF2B5EF4-FFF2-40B4-BE49-F238E27FC236}">
-                <a16:creationId xmlns:a16="http://schemas.microsoft.com/office/drawing/2014/main" xmlns="" id="{E02480D4-E98A-4B59-965C-CA82CB7EB6C5}"/>
+                <a16:creationId xmlns:a16="http://schemas.microsoft.com/office/drawing/2014/main" id="{E02480D4-E98A-4B59-965C-CA82CB7EB6C5}"/>
               </a:ext>
             </a:extLst>
           </p:cNvPr>
@@ -2605,7 +2606,7 @@
           <p:cNvPr id="3" name="Content Placeholder 2">
             <a:extLst>
               <a:ext uri="{FF2B5EF4-FFF2-40B4-BE49-F238E27FC236}">
-                <a16:creationId xmlns:a16="http://schemas.microsoft.com/office/drawing/2014/main" xmlns="" id="{6231BF26-5D2A-4289-9641-CF620588B51C}"/>
+                <a16:creationId xmlns:a16="http://schemas.microsoft.com/office/drawing/2014/main" id="{6231BF26-5D2A-4289-9641-CF620588B51C}"/>
               </a:ext>
             </a:extLst>
           </p:cNvPr>
@@ -2695,7 +2696,7 @@
           <p:cNvPr id="4" name="Text Placeholder 3">
             <a:extLst>
               <a:ext uri="{FF2B5EF4-FFF2-40B4-BE49-F238E27FC236}">
-                <a16:creationId xmlns:a16="http://schemas.microsoft.com/office/drawing/2014/main" xmlns="" id="{38F9CC51-2BD9-45FA-9E5B-E492867403AE}"/>
+                <a16:creationId xmlns:a16="http://schemas.microsoft.com/office/drawing/2014/main" id="{38F9CC51-2BD9-45FA-9E5B-E492867403AE}"/>
               </a:ext>
             </a:extLst>
           </p:cNvPr>
@@ -2766,7 +2767,7 @@
           <p:cNvPr id="5" name="Date Placeholder 4">
             <a:extLst>
               <a:ext uri="{FF2B5EF4-FFF2-40B4-BE49-F238E27FC236}">
-                <a16:creationId xmlns:a16="http://schemas.microsoft.com/office/drawing/2014/main" xmlns="" id="{7A78ABCF-21AE-4D27-B27D-0C1E341D402B}"/>
+                <a16:creationId xmlns:a16="http://schemas.microsoft.com/office/drawing/2014/main" id="{7A78ABCF-21AE-4D27-B27D-0C1E341D402B}"/>
               </a:ext>
             </a:extLst>
           </p:cNvPr>
@@ -2791,7 +2792,7 @@
                 </a:solidFill>
               </a:rPr>
               <a:pPr/>
-              <a:t>4/1/2019</a:t>
+              <a:t>4/25/2019</a:t>
             </a:fld>
             <a:endParaRPr lang="en-US">
               <a:solidFill>
@@ -2808,7 +2809,7 @@
           <p:cNvPr id="6" name="Footer Placeholder 5">
             <a:extLst>
               <a:ext uri="{FF2B5EF4-FFF2-40B4-BE49-F238E27FC236}">
-                <a16:creationId xmlns:a16="http://schemas.microsoft.com/office/drawing/2014/main" xmlns="" id="{035B3782-ED09-4403-9937-7FAAAFFFC469}"/>
+                <a16:creationId xmlns:a16="http://schemas.microsoft.com/office/drawing/2014/main" id="{035B3782-ED09-4403-9937-7FAAAFFFC469}"/>
               </a:ext>
             </a:extLst>
           </p:cNvPr>
@@ -2839,7 +2840,7 @@
           <p:cNvPr id="7" name="Slide Number Placeholder 6">
             <a:extLst>
               <a:ext uri="{FF2B5EF4-FFF2-40B4-BE49-F238E27FC236}">
-                <a16:creationId xmlns:a16="http://schemas.microsoft.com/office/drawing/2014/main" xmlns="" id="{C1324151-F204-48F9-B9C8-B9C70F4539B4}"/>
+                <a16:creationId xmlns:a16="http://schemas.microsoft.com/office/drawing/2014/main" id="{C1324151-F204-48F9-B9C8-B9C70F4539B4}"/>
               </a:ext>
             </a:extLst>
           </p:cNvPr>
@@ -2922,10 +2923,9 @@
           <a:lstStyle/>
           <a:p>
             <a:r>
-              <a:rPr lang="he-IL" smtClean="0"/>
+              <a:rPr lang="he-IL"/>
               <a:t>לחץ כדי לערוך סגנון כותרת של תבנית בסיס</a:t>
             </a:r>
-            <a:endParaRPr lang="he-IL"/>
           </a:p>
         </p:txBody>
       </p:sp>
@@ -2946,38 +2946,37 @@
           <a:p>
             <a:pPr lvl="0"/>
             <a:r>
-              <a:rPr lang="he-IL" smtClean="0"/>
+              <a:rPr lang="he-IL"/>
               <a:t>לחץ כדי לערוך סגנונות טקסט של תבנית בסיס</a:t>
             </a:r>
           </a:p>
           <a:p>
             <a:pPr lvl="1"/>
             <a:r>
-              <a:rPr lang="he-IL" smtClean="0"/>
+              <a:rPr lang="he-IL"/>
               <a:t>רמה שנייה</a:t>
             </a:r>
           </a:p>
           <a:p>
             <a:pPr lvl="2"/>
             <a:r>
-              <a:rPr lang="he-IL" smtClean="0"/>
+              <a:rPr lang="he-IL"/>
               <a:t>רמה שלישית</a:t>
             </a:r>
           </a:p>
           <a:p>
             <a:pPr lvl="3"/>
             <a:r>
-              <a:rPr lang="he-IL" smtClean="0"/>
+              <a:rPr lang="he-IL"/>
               <a:t>רמה רביעית</a:t>
             </a:r>
           </a:p>
           <a:p>
             <a:pPr lvl="4"/>
             <a:r>
-              <a:rPr lang="he-IL" smtClean="0"/>
+              <a:rPr lang="he-IL"/>
               <a:t>רמה חמישית</a:t>
             </a:r>
-            <a:endParaRPr lang="he-IL"/>
           </a:p>
         </p:txBody>
       </p:sp>
@@ -2998,7 +2997,7 @@
           <a:p>
             <a:fld id="{022F9609-C2A5-48F5-93C6-285E682E4BDE}" type="datetimeFigureOut">
               <a:rPr lang="he-IL" smtClean="0"/>
-              <a:t>כ"ה/אדר ב/תשע"ט</a:t>
+              <a:t>כ'/ניסן/תשע"ט</a:t>
             </a:fld>
             <a:endParaRPr lang="he-IL"/>
           </a:p>
@@ -3081,7 +3080,7 @@
           <p:cNvPr id="2" name="Title 1">
             <a:extLst>
               <a:ext uri="{FF2B5EF4-FFF2-40B4-BE49-F238E27FC236}">
-                <a16:creationId xmlns:a16="http://schemas.microsoft.com/office/drawing/2014/main" xmlns="" id="{9E347906-BC9B-4FF2-AA3D-809037597011}"/>
+                <a16:creationId xmlns:a16="http://schemas.microsoft.com/office/drawing/2014/main" id="{9E347906-BC9B-4FF2-AA3D-809037597011}"/>
               </a:ext>
             </a:extLst>
           </p:cNvPr>
@@ -3118,7 +3117,7 @@
           <p:cNvPr id="3" name="Picture Placeholder 2">
             <a:extLst>
               <a:ext uri="{FF2B5EF4-FFF2-40B4-BE49-F238E27FC236}">
-                <a16:creationId xmlns:a16="http://schemas.microsoft.com/office/drawing/2014/main" xmlns="" id="{31F04F47-9E29-4263-B350-5BBF0F8C38E5}"/>
+                <a16:creationId xmlns:a16="http://schemas.microsoft.com/office/drawing/2014/main" id="{31F04F47-9E29-4263-B350-5BBF0F8C38E5}"/>
               </a:ext>
             </a:extLst>
           </p:cNvPr>
@@ -3185,7 +3184,7 @@
           <p:cNvPr id="4" name="Text Placeholder 3">
             <a:extLst>
               <a:ext uri="{FF2B5EF4-FFF2-40B4-BE49-F238E27FC236}">
-                <a16:creationId xmlns:a16="http://schemas.microsoft.com/office/drawing/2014/main" xmlns="" id="{5A5CFAE9-87ED-4E01-95F6-D3D521F17CA0}"/>
+                <a16:creationId xmlns:a16="http://schemas.microsoft.com/office/drawing/2014/main" id="{5A5CFAE9-87ED-4E01-95F6-D3D521F17CA0}"/>
               </a:ext>
             </a:extLst>
           </p:cNvPr>
@@ -3256,7 +3255,7 @@
           <p:cNvPr id="5" name="Date Placeholder 4">
             <a:extLst>
               <a:ext uri="{FF2B5EF4-FFF2-40B4-BE49-F238E27FC236}">
-                <a16:creationId xmlns:a16="http://schemas.microsoft.com/office/drawing/2014/main" xmlns="" id="{C10226FA-8A60-45D3-8CD6-98F45C7DC2E3}"/>
+                <a16:creationId xmlns:a16="http://schemas.microsoft.com/office/drawing/2014/main" id="{C10226FA-8A60-45D3-8CD6-98F45C7DC2E3}"/>
               </a:ext>
             </a:extLst>
           </p:cNvPr>
@@ -3281,7 +3280,7 @@
                 </a:solidFill>
               </a:rPr>
               <a:pPr/>
-              <a:t>4/1/2019</a:t>
+              <a:t>4/25/2019</a:t>
             </a:fld>
             <a:endParaRPr lang="en-US">
               <a:solidFill>
@@ -3298,7 +3297,7 @@
           <p:cNvPr id="6" name="Footer Placeholder 5">
             <a:extLst>
               <a:ext uri="{FF2B5EF4-FFF2-40B4-BE49-F238E27FC236}">
-                <a16:creationId xmlns:a16="http://schemas.microsoft.com/office/drawing/2014/main" xmlns="" id="{A7338561-4572-411B-B759-E6BAB9EEFE9F}"/>
+                <a16:creationId xmlns:a16="http://schemas.microsoft.com/office/drawing/2014/main" id="{A7338561-4572-411B-B759-E6BAB9EEFE9F}"/>
               </a:ext>
             </a:extLst>
           </p:cNvPr>
@@ -3329,7 +3328,7 @@
           <p:cNvPr id="7" name="Slide Number Placeholder 6">
             <a:extLst>
               <a:ext uri="{FF2B5EF4-FFF2-40B4-BE49-F238E27FC236}">
-                <a16:creationId xmlns:a16="http://schemas.microsoft.com/office/drawing/2014/main" xmlns="" id="{605B2637-B214-49CA-BD9D-1CA5ADE05232}"/>
+                <a16:creationId xmlns:a16="http://schemas.microsoft.com/office/drawing/2014/main" id="{605B2637-B214-49CA-BD9D-1CA5ADE05232}"/>
               </a:ext>
             </a:extLst>
           </p:cNvPr>
@@ -3401,7 +3400,7 @@
           <p:cNvPr id="2" name="Title 1">
             <a:extLst>
               <a:ext uri="{FF2B5EF4-FFF2-40B4-BE49-F238E27FC236}">
-                <a16:creationId xmlns:a16="http://schemas.microsoft.com/office/drawing/2014/main" xmlns="" id="{50F9D09C-4FD7-43A2-A9C4-7AF3E45F6A2F}"/>
+                <a16:creationId xmlns:a16="http://schemas.microsoft.com/office/drawing/2014/main" id="{50F9D09C-4FD7-43A2-A9C4-7AF3E45F6A2F}"/>
               </a:ext>
             </a:extLst>
           </p:cNvPr>
@@ -3429,7 +3428,7 @@
           <p:cNvPr id="3" name="Vertical Text Placeholder 2">
             <a:extLst>
               <a:ext uri="{FF2B5EF4-FFF2-40B4-BE49-F238E27FC236}">
-                <a16:creationId xmlns:a16="http://schemas.microsoft.com/office/drawing/2014/main" xmlns="" id="{7178CA19-320B-4072-A296-CCF143893C3B}"/>
+                <a16:creationId xmlns:a16="http://schemas.microsoft.com/office/drawing/2014/main" id="{7178CA19-320B-4072-A296-CCF143893C3B}"/>
               </a:ext>
             </a:extLst>
           </p:cNvPr>
@@ -3486,7 +3485,7 @@
           <p:cNvPr id="4" name="Date Placeholder 3">
             <a:extLst>
               <a:ext uri="{FF2B5EF4-FFF2-40B4-BE49-F238E27FC236}">
-                <a16:creationId xmlns:a16="http://schemas.microsoft.com/office/drawing/2014/main" xmlns="" id="{EF915A9B-1536-40C4-90F9-B0B9AE5B26C5}"/>
+                <a16:creationId xmlns:a16="http://schemas.microsoft.com/office/drawing/2014/main" id="{EF915A9B-1536-40C4-90F9-B0B9AE5B26C5}"/>
               </a:ext>
             </a:extLst>
           </p:cNvPr>
@@ -3511,7 +3510,7 @@
                 </a:solidFill>
               </a:rPr>
               <a:pPr/>
-              <a:t>4/1/2019</a:t>
+              <a:t>4/25/2019</a:t>
             </a:fld>
             <a:endParaRPr lang="en-US">
               <a:solidFill>
@@ -3528,7 +3527,7 @@
           <p:cNvPr id="5" name="Footer Placeholder 4">
             <a:extLst>
               <a:ext uri="{FF2B5EF4-FFF2-40B4-BE49-F238E27FC236}">
-                <a16:creationId xmlns:a16="http://schemas.microsoft.com/office/drawing/2014/main" xmlns="" id="{8E33A411-BCF4-4BBC-95FB-7907C9967996}"/>
+                <a16:creationId xmlns:a16="http://schemas.microsoft.com/office/drawing/2014/main" id="{8E33A411-BCF4-4BBC-95FB-7907C9967996}"/>
               </a:ext>
             </a:extLst>
           </p:cNvPr>
@@ -3559,7 +3558,7 @@
           <p:cNvPr id="6" name="Slide Number Placeholder 5">
             <a:extLst>
               <a:ext uri="{FF2B5EF4-FFF2-40B4-BE49-F238E27FC236}">
-                <a16:creationId xmlns:a16="http://schemas.microsoft.com/office/drawing/2014/main" xmlns="" id="{59E50DFE-C265-43F7-802A-9BC5B2F394BF}"/>
+                <a16:creationId xmlns:a16="http://schemas.microsoft.com/office/drawing/2014/main" id="{59E50DFE-C265-43F7-802A-9BC5B2F394BF}"/>
               </a:ext>
             </a:extLst>
           </p:cNvPr>
@@ -3631,7 +3630,7 @@
           <p:cNvPr id="2" name="Vertical Title 1">
             <a:extLst>
               <a:ext uri="{FF2B5EF4-FFF2-40B4-BE49-F238E27FC236}">
-                <a16:creationId xmlns:a16="http://schemas.microsoft.com/office/drawing/2014/main" xmlns="" id="{A836859C-5E3C-44C6-AE2B-3782B406A5CF}"/>
+                <a16:creationId xmlns:a16="http://schemas.microsoft.com/office/drawing/2014/main" id="{A836859C-5E3C-44C6-AE2B-3782B406A5CF}"/>
               </a:ext>
             </a:extLst>
           </p:cNvPr>
@@ -3664,7 +3663,7 @@
           <p:cNvPr id="3" name="Vertical Text Placeholder 2">
             <a:extLst>
               <a:ext uri="{FF2B5EF4-FFF2-40B4-BE49-F238E27FC236}">
-                <a16:creationId xmlns:a16="http://schemas.microsoft.com/office/drawing/2014/main" xmlns="" id="{597F48F4-7A35-40B3-9DBC-1A6A8BAFD234}"/>
+                <a16:creationId xmlns:a16="http://schemas.microsoft.com/office/drawing/2014/main" id="{597F48F4-7A35-40B3-9DBC-1A6A8BAFD234}"/>
               </a:ext>
             </a:extLst>
           </p:cNvPr>
@@ -3726,7 +3725,7 @@
           <p:cNvPr id="4" name="Date Placeholder 3">
             <a:extLst>
               <a:ext uri="{FF2B5EF4-FFF2-40B4-BE49-F238E27FC236}">
-                <a16:creationId xmlns:a16="http://schemas.microsoft.com/office/drawing/2014/main" xmlns="" id="{1435008E-2F54-4622-9912-E4D2BEF60340}"/>
+                <a16:creationId xmlns:a16="http://schemas.microsoft.com/office/drawing/2014/main" id="{1435008E-2F54-4622-9912-E4D2BEF60340}"/>
               </a:ext>
             </a:extLst>
           </p:cNvPr>
@@ -3751,7 +3750,7 @@
                 </a:solidFill>
               </a:rPr>
               <a:pPr/>
-              <a:t>4/1/2019</a:t>
+              <a:t>4/25/2019</a:t>
             </a:fld>
             <a:endParaRPr lang="en-US">
               <a:solidFill>
@@ -3768,7 +3767,7 @@
           <p:cNvPr id="5" name="Footer Placeholder 4">
             <a:extLst>
               <a:ext uri="{FF2B5EF4-FFF2-40B4-BE49-F238E27FC236}">
-                <a16:creationId xmlns:a16="http://schemas.microsoft.com/office/drawing/2014/main" xmlns="" id="{2BC0054C-886F-474E-A35B-18AB87A067F4}"/>
+                <a16:creationId xmlns:a16="http://schemas.microsoft.com/office/drawing/2014/main" id="{2BC0054C-886F-474E-A35B-18AB87A067F4}"/>
               </a:ext>
             </a:extLst>
           </p:cNvPr>
@@ -3799,7 +3798,7 @@
           <p:cNvPr id="6" name="Slide Number Placeholder 5">
             <a:extLst>
               <a:ext uri="{FF2B5EF4-FFF2-40B4-BE49-F238E27FC236}">
-                <a16:creationId xmlns:a16="http://schemas.microsoft.com/office/drawing/2014/main" xmlns="" id="{9409720B-6825-48B3-BF5A-46D3B344FCA2}"/>
+                <a16:creationId xmlns:a16="http://schemas.microsoft.com/office/drawing/2014/main" id="{9409720B-6825-48B3-BF5A-46D3B344FCA2}"/>
               </a:ext>
             </a:extLst>
           </p:cNvPr>
@@ -3891,10 +3890,9 @@
           </a:lstStyle>
           <a:p>
             <a:r>
-              <a:rPr lang="he-IL" smtClean="0"/>
+              <a:rPr lang="he-IL"/>
               <a:t>לחץ כדי לערוך סגנון כותרת של תבנית בסיס</a:t>
             </a:r>
-            <a:endParaRPr lang="he-IL"/>
           </a:p>
         </p:txBody>
       </p:sp>
@@ -4011,7 +4009,7 @@
           <a:p>
             <a:pPr lvl="0"/>
             <a:r>
-              <a:rPr lang="he-IL" smtClean="0"/>
+              <a:rPr lang="he-IL"/>
               <a:t>לחץ כדי לערוך סגנונות טקסט של תבנית בסיס</a:t>
             </a:r>
           </a:p>
@@ -4034,7 +4032,7 @@
           <a:p>
             <a:fld id="{022F9609-C2A5-48F5-93C6-285E682E4BDE}" type="datetimeFigureOut">
               <a:rPr lang="he-IL" smtClean="0"/>
-              <a:t>כ"ה/אדר ב/תשע"ט</a:t>
+              <a:t>כ'/ניסן/תשע"ט</a:t>
             </a:fld>
             <a:endParaRPr lang="he-IL"/>
           </a:p>
@@ -4128,10 +4126,9 @@
           <a:lstStyle/>
           <a:p>
             <a:r>
-              <a:rPr lang="he-IL" smtClean="0"/>
+              <a:rPr lang="he-IL"/>
               <a:t>לחץ כדי לערוך סגנון כותרת של תבנית בסיס</a:t>
             </a:r>
-            <a:endParaRPr lang="he-IL"/>
           </a:p>
         </p:txBody>
       </p:sp>
@@ -4157,38 +4154,37 @@
           <a:p>
             <a:pPr lvl="0"/>
             <a:r>
-              <a:rPr lang="he-IL" smtClean="0"/>
+              <a:rPr lang="he-IL"/>
               <a:t>לחץ כדי לערוך סגנונות טקסט של תבנית בסיס</a:t>
             </a:r>
           </a:p>
           <a:p>
             <a:pPr lvl="1"/>
             <a:r>
-              <a:rPr lang="he-IL" smtClean="0"/>
+              <a:rPr lang="he-IL"/>
               <a:t>רמה שנייה</a:t>
             </a:r>
           </a:p>
           <a:p>
             <a:pPr lvl="2"/>
             <a:r>
-              <a:rPr lang="he-IL" smtClean="0"/>
+              <a:rPr lang="he-IL"/>
               <a:t>רמה שלישית</a:t>
             </a:r>
           </a:p>
           <a:p>
             <a:pPr lvl="3"/>
             <a:r>
-              <a:rPr lang="he-IL" smtClean="0"/>
+              <a:rPr lang="he-IL"/>
               <a:t>רמה רביעית</a:t>
             </a:r>
           </a:p>
           <a:p>
             <a:pPr lvl="4"/>
             <a:r>
-              <a:rPr lang="he-IL" smtClean="0"/>
+              <a:rPr lang="he-IL"/>
               <a:t>רמה חמישית</a:t>
             </a:r>
-            <a:endParaRPr lang="he-IL"/>
           </a:p>
         </p:txBody>
       </p:sp>
@@ -4214,38 +4210,37 @@
           <a:p>
             <a:pPr lvl="0"/>
             <a:r>
-              <a:rPr lang="he-IL" smtClean="0"/>
+              <a:rPr lang="he-IL"/>
               <a:t>לחץ כדי לערוך סגנונות טקסט של תבנית בסיס</a:t>
             </a:r>
           </a:p>
           <a:p>
             <a:pPr lvl="1"/>
             <a:r>
-              <a:rPr lang="he-IL" smtClean="0"/>
+              <a:rPr lang="he-IL"/>
               <a:t>רמה שנייה</a:t>
             </a:r>
           </a:p>
           <a:p>
             <a:pPr lvl="2"/>
             <a:r>
-              <a:rPr lang="he-IL" smtClean="0"/>
+              <a:rPr lang="he-IL"/>
               <a:t>רמה שלישית</a:t>
             </a:r>
           </a:p>
           <a:p>
             <a:pPr lvl="3"/>
             <a:r>
-              <a:rPr lang="he-IL" smtClean="0"/>
+              <a:rPr lang="he-IL"/>
               <a:t>רמה רביעית</a:t>
             </a:r>
           </a:p>
           <a:p>
             <a:pPr lvl="4"/>
             <a:r>
-              <a:rPr lang="he-IL" smtClean="0"/>
+              <a:rPr lang="he-IL"/>
               <a:t>רמה חמישית</a:t>
             </a:r>
-            <a:endParaRPr lang="he-IL"/>
           </a:p>
         </p:txBody>
       </p:sp>
@@ -4266,7 +4261,7 @@
           <a:p>
             <a:fld id="{022F9609-C2A5-48F5-93C6-285E682E4BDE}" type="datetimeFigureOut">
               <a:rPr lang="he-IL" smtClean="0"/>
-              <a:t>כ"ה/אדר ב/תשע"ט</a:t>
+              <a:t>כ'/ניסן/תשע"ט</a:t>
             </a:fld>
             <a:endParaRPr lang="he-IL"/>
           </a:p>
@@ -4365,10 +4360,9 @@
           <a:lstStyle/>
           <a:p>
             <a:r>
-              <a:rPr lang="he-IL" smtClean="0"/>
+              <a:rPr lang="he-IL"/>
               <a:t>לחץ כדי לערוך סגנון כותרת של תבנית בסיס</a:t>
             </a:r>
-            <a:endParaRPr lang="he-IL"/>
           </a:p>
         </p:txBody>
       </p:sp>
@@ -4431,7 +4425,7 @@
           <a:p>
             <a:pPr lvl="0"/>
             <a:r>
-              <a:rPr lang="he-IL" smtClean="0"/>
+              <a:rPr lang="he-IL"/>
               <a:t>לחץ כדי לערוך סגנונות טקסט של תבנית בסיס</a:t>
             </a:r>
           </a:p>
@@ -4459,38 +4453,37 @@
           <a:p>
             <a:pPr lvl="0"/>
             <a:r>
-              <a:rPr lang="he-IL" smtClean="0"/>
+              <a:rPr lang="he-IL"/>
               <a:t>לחץ כדי לערוך סגנונות טקסט של תבנית בסיס</a:t>
             </a:r>
           </a:p>
           <a:p>
             <a:pPr lvl="1"/>
             <a:r>
-              <a:rPr lang="he-IL" smtClean="0"/>
+              <a:rPr lang="he-IL"/>
               <a:t>רמה שנייה</a:t>
             </a:r>
           </a:p>
           <a:p>
             <a:pPr lvl="2"/>
             <a:r>
-              <a:rPr lang="he-IL" smtClean="0"/>
+              <a:rPr lang="he-IL"/>
               <a:t>רמה שלישית</a:t>
             </a:r>
           </a:p>
           <a:p>
             <a:pPr lvl="3"/>
             <a:r>
-              <a:rPr lang="he-IL" smtClean="0"/>
+              <a:rPr lang="he-IL"/>
               <a:t>רמה רביעית</a:t>
             </a:r>
           </a:p>
           <a:p>
             <a:pPr lvl="4"/>
             <a:r>
-              <a:rPr lang="he-IL" smtClean="0"/>
+              <a:rPr lang="he-IL"/>
               <a:t>רמה חמישית</a:t>
             </a:r>
-            <a:endParaRPr lang="he-IL"/>
           </a:p>
         </p:txBody>
       </p:sp>
@@ -4553,7 +4546,7 @@
           <a:p>
             <a:pPr lvl="0"/>
             <a:r>
-              <a:rPr lang="he-IL" smtClean="0"/>
+              <a:rPr lang="he-IL"/>
               <a:t>לחץ כדי לערוך סגנונות טקסט של תבנית בסיס</a:t>
             </a:r>
           </a:p>
@@ -4581,38 +4574,37 @@
           <a:p>
             <a:pPr lvl="0"/>
             <a:r>
-              <a:rPr lang="he-IL" smtClean="0"/>
+              <a:rPr lang="he-IL"/>
               <a:t>לחץ כדי לערוך סגנונות טקסט של תבנית בסיס</a:t>
             </a:r>
           </a:p>
           <a:p>
             <a:pPr lvl="1"/>
             <a:r>
-              <a:rPr lang="he-IL" smtClean="0"/>
+              <a:rPr lang="he-IL"/>
               <a:t>רמה שנייה</a:t>
             </a:r>
           </a:p>
           <a:p>
             <a:pPr lvl="2"/>
             <a:r>
-              <a:rPr lang="he-IL" smtClean="0"/>
+              <a:rPr lang="he-IL"/>
               <a:t>רמה שלישית</a:t>
             </a:r>
           </a:p>
           <a:p>
             <a:pPr lvl="3"/>
             <a:r>
-              <a:rPr lang="he-IL" smtClean="0"/>
+              <a:rPr lang="he-IL"/>
               <a:t>רמה רביעית</a:t>
             </a:r>
           </a:p>
           <a:p>
             <a:pPr lvl="4"/>
             <a:r>
-              <a:rPr lang="he-IL" smtClean="0"/>
+              <a:rPr lang="he-IL"/>
               <a:t>רמה חמישית</a:t>
             </a:r>
-            <a:endParaRPr lang="he-IL"/>
           </a:p>
         </p:txBody>
       </p:sp>
@@ -4633,7 +4625,7 @@
           <a:p>
             <a:fld id="{022F9609-C2A5-48F5-93C6-285E682E4BDE}" type="datetimeFigureOut">
               <a:rPr lang="he-IL" smtClean="0"/>
-              <a:t>כ"ה/אדר ב/תשע"ט</a:t>
+              <a:t>כ'/ניסן/תשע"ט</a:t>
             </a:fld>
             <a:endParaRPr lang="he-IL"/>
           </a:p>
@@ -4727,10 +4719,9 @@
           <a:lstStyle/>
           <a:p>
             <a:r>
-              <a:rPr lang="he-IL" smtClean="0"/>
+              <a:rPr lang="he-IL"/>
               <a:t>לחץ כדי לערוך סגנון כותרת של תבנית בסיס</a:t>
             </a:r>
-            <a:endParaRPr lang="he-IL"/>
           </a:p>
         </p:txBody>
       </p:sp>
@@ -4751,7 +4742,7 @@
           <a:p>
             <a:fld id="{022F9609-C2A5-48F5-93C6-285E682E4BDE}" type="datetimeFigureOut">
               <a:rPr lang="he-IL" smtClean="0"/>
-              <a:t>כ"ה/אדר ב/תשע"ט</a:t>
+              <a:t>כ'/ניסן/תשע"ט</a:t>
             </a:fld>
             <a:endParaRPr lang="he-IL"/>
           </a:p>
@@ -4846,7 +4837,7 @@
           <a:p>
             <a:fld id="{022F9609-C2A5-48F5-93C6-285E682E4BDE}" type="datetimeFigureOut">
               <a:rPr lang="he-IL" smtClean="0"/>
-              <a:t>כ"ה/אדר ב/תשע"ט</a:t>
+              <a:t>כ'/ניסן/תשע"ט</a:t>
             </a:fld>
             <a:endParaRPr lang="he-IL"/>
           </a:p>
@@ -4949,10 +4940,9 @@
           </a:lstStyle>
           <a:p>
             <a:r>
-              <a:rPr lang="he-IL" smtClean="0"/>
+              <a:rPr lang="he-IL"/>
               <a:t>לחץ כדי לערוך סגנון כותרת של תבנית בסיס</a:t>
             </a:r>
-            <a:endParaRPr lang="he-IL"/>
           </a:p>
         </p:txBody>
       </p:sp>
@@ -5006,38 +4996,37 @@
           <a:p>
             <a:pPr lvl="0"/>
             <a:r>
-              <a:rPr lang="he-IL" smtClean="0"/>
+              <a:rPr lang="he-IL"/>
               <a:t>לחץ כדי לערוך סגנונות טקסט של תבנית בסיס</a:t>
             </a:r>
           </a:p>
           <a:p>
             <a:pPr lvl="1"/>
             <a:r>
-              <a:rPr lang="he-IL" smtClean="0"/>
+              <a:rPr lang="he-IL"/>
               <a:t>רמה שנייה</a:t>
             </a:r>
           </a:p>
           <a:p>
             <a:pPr lvl="2"/>
             <a:r>
-              <a:rPr lang="he-IL" smtClean="0"/>
+              <a:rPr lang="he-IL"/>
               <a:t>רמה שלישית</a:t>
             </a:r>
           </a:p>
           <a:p>
             <a:pPr lvl="3"/>
             <a:r>
-              <a:rPr lang="he-IL" smtClean="0"/>
+              <a:rPr lang="he-IL"/>
               <a:t>רמה רביעית</a:t>
             </a:r>
           </a:p>
           <a:p>
             <a:pPr lvl="4"/>
             <a:r>
-              <a:rPr lang="he-IL" smtClean="0"/>
+              <a:rPr lang="he-IL"/>
               <a:t>רמה חמישית</a:t>
             </a:r>
-            <a:endParaRPr lang="he-IL"/>
           </a:p>
         </p:txBody>
       </p:sp>
@@ -5100,7 +5089,7 @@
           <a:p>
             <a:pPr lvl="0"/>
             <a:r>
-              <a:rPr lang="he-IL" smtClean="0"/>
+              <a:rPr lang="he-IL"/>
               <a:t>לחץ כדי לערוך סגנונות טקסט של תבנית בסיס</a:t>
             </a:r>
           </a:p>
@@ -5123,7 +5112,7 @@
           <a:p>
             <a:fld id="{022F9609-C2A5-48F5-93C6-285E682E4BDE}" type="datetimeFigureOut">
               <a:rPr lang="he-IL" smtClean="0"/>
-              <a:t>כ"ה/אדר ב/תשע"ט</a:t>
+              <a:t>כ'/ניסן/תשע"ט</a:t>
             </a:fld>
             <a:endParaRPr lang="he-IL"/>
           </a:p>
@@ -5226,10 +5215,9 @@
           </a:lstStyle>
           <a:p>
             <a:r>
-              <a:rPr lang="he-IL" smtClean="0"/>
+              <a:rPr lang="he-IL"/>
               <a:t>לחץ כדי לערוך סגנון כותרת של תבנית בסיס</a:t>
             </a:r>
-            <a:endParaRPr lang="he-IL"/>
           </a:p>
         </p:txBody>
       </p:sp>
@@ -5353,7 +5341,7 @@
           <a:p>
             <a:pPr lvl="0"/>
             <a:r>
-              <a:rPr lang="he-IL" smtClean="0"/>
+              <a:rPr lang="he-IL"/>
               <a:t>לחץ כדי לערוך סגנונות טקסט של תבנית בסיס</a:t>
             </a:r>
           </a:p>
@@ -5376,7 +5364,7 @@
           <a:p>
             <a:fld id="{022F9609-C2A5-48F5-93C6-285E682E4BDE}" type="datetimeFigureOut">
               <a:rPr lang="he-IL" smtClean="0"/>
-              <a:t>כ"ה/אדר ב/תשע"ט</a:t>
+              <a:t>כ'/ניסן/תשע"ט</a:t>
             </a:fld>
             <a:endParaRPr lang="he-IL"/>
           </a:p>
@@ -5485,10 +5473,9 @@
           <a:lstStyle/>
           <a:p>
             <a:r>
-              <a:rPr lang="he-IL" smtClean="0"/>
+              <a:rPr lang="he-IL"/>
               <a:t>לחץ כדי לערוך סגנון כותרת של תבנית בסיס</a:t>
             </a:r>
-            <a:endParaRPr lang="he-IL"/>
           </a:p>
         </p:txBody>
       </p:sp>
@@ -5519,38 +5506,37 @@
           <a:p>
             <a:pPr lvl="0"/>
             <a:r>
-              <a:rPr lang="he-IL" smtClean="0"/>
+              <a:rPr lang="he-IL"/>
               <a:t>לחץ כדי לערוך סגנונות טקסט של תבנית בסיס</a:t>
             </a:r>
           </a:p>
           <a:p>
             <a:pPr lvl="1"/>
             <a:r>
-              <a:rPr lang="he-IL" smtClean="0"/>
+              <a:rPr lang="he-IL"/>
               <a:t>רמה שנייה</a:t>
             </a:r>
           </a:p>
           <a:p>
             <a:pPr lvl="2"/>
             <a:r>
-              <a:rPr lang="he-IL" smtClean="0"/>
+              <a:rPr lang="he-IL"/>
               <a:t>רמה שלישית</a:t>
             </a:r>
           </a:p>
           <a:p>
             <a:pPr lvl="3"/>
             <a:r>
-              <a:rPr lang="he-IL" smtClean="0"/>
+              <a:rPr lang="he-IL"/>
               <a:t>רמה רביעית</a:t>
             </a:r>
           </a:p>
           <a:p>
             <a:pPr lvl="4"/>
             <a:r>
-              <a:rPr lang="he-IL" smtClean="0"/>
+              <a:rPr lang="he-IL"/>
               <a:t>רמה חמישית</a:t>
             </a:r>
-            <a:endParaRPr lang="he-IL"/>
           </a:p>
         </p:txBody>
       </p:sp>
@@ -5589,7 +5575,7 @@
           <a:p>
             <a:fld id="{022F9609-C2A5-48F5-93C6-285E682E4BDE}" type="datetimeFigureOut">
               <a:rPr lang="he-IL" smtClean="0"/>
-              <a:t>כ"ה/אדר ב/תשע"ט</a:t>
+              <a:t>כ'/ניסן/תשע"ט</a:t>
             </a:fld>
             <a:endParaRPr lang="he-IL"/>
           </a:p>
@@ -6004,7 +5990,7 @@
           <p:cNvPr id="16" name="Rectangle 15">
             <a:extLst>
               <a:ext uri="{FF2B5EF4-FFF2-40B4-BE49-F238E27FC236}">
-                <a16:creationId xmlns:a16="http://schemas.microsoft.com/office/drawing/2014/main" xmlns="" id="{E3369B47-F7CA-2747-A53F-187F9D637249}"/>
+                <a16:creationId xmlns:a16="http://schemas.microsoft.com/office/drawing/2014/main" id="{E3369B47-F7CA-2747-A53F-187F9D637249}"/>
               </a:ext>
             </a:extLst>
           </p:cNvPr>
@@ -6060,7 +6046,7 @@
           <p:cNvPr id="24" name="Picture 23">
             <a:extLst>
               <a:ext uri="{FF2B5EF4-FFF2-40B4-BE49-F238E27FC236}">
-                <a16:creationId xmlns:a16="http://schemas.microsoft.com/office/drawing/2014/main" xmlns="" id="{34342C8D-9C92-43AB-9BEA-E27D9B7F0DDD}"/>
+                <a16:creationId xmlns:a16="http://schemas.microsoft.com/office/drawing/2014/main" id="{34342C8D-9C92-43AB-9BEA-E27D9B7F0DDD}"/>
               </a:ext>
             </a:extLst>
           </p:cNvPr>
@@ -6096,7 +6082,7 @@
           <p:cNvPr id="2" name="Title Placeholder 1">
             <a:extLst>
               <a:ext uri="{FF2B5EF4-FFF2-40B4-BE49-F238E27FC236}">
-                <a16:creationId xmlns:a16="http://schemas.microsoft.com/office/drawing/2014/main" xmlns="" id="{AC6040C6-DCCF-4AEC-9E1F-A97897F8741D}"/>
+                <a16:creationId xmlns:a16="http://schemas.microsoft.com/office/drawing/2014/main" id="{AC6040C6-DCCF-4AEC-9E1F-A97897F8741D}"/>
               </a:ext>
             </a:extLst>
           </p:cNvPr>
@@ -6134,7 +6120,7 @@
           <p:cNvPr id="3" name="Text Placeholder 2">
             <a:extLst>
               <a:ext uri="{FF2B5EF4-FFF2-40B4-BE49-F238E27FC236}">
-                <a16:creationId xmlns:a16="http://schemas.microsoft.com/office/drawing/2014/main" xmlns="" id="{BCC7F9AD-4548-4407-A186-C0679F45D6FE}"/>
+                <a16:creationId xmlns:a16="http://schemas.microsoft.com/office/drawing/2014/main" id="{BCC7F9AD-4548-4407-A186-C0679F45D6FE}"/>
               </a:ext>
             </a:extLst>
           </p:cNvPr>
@@ -6201,7 +6187,7 @@
           <p:cNvPr id="4" name="Date Placeholder 3">
             <a:extLst>
               <a:ext uri="{FF2B5EF4-FFF2-40B4-BE49-F238E27FC236}">
-                <a16:creationId xmlns:a16="http://schemas.microsoft.com/office/drawing/2014/main" xmlns="" id="{CBAB015C-00D5-42C7-BC2E-D98603A1D639}"/>
+                <a16:creationId xmlns:a16="http://schemas.microsoft.com/office/drawing/2014/main" id="{CBAB015C-00D5-42C7-BC2E-D98603A1D639}"/>
               </a:ext>
             </a:extLst>
           </p:cNvPr>
@@ -6245,7 +6231,7 @@
                 </a:solidFill>
               </a:rPr>
               <a:pPr rtl="0"/>
-              <a:t>4/1/2019</a:t>
+              <a:t>4/25/2019</a:t>
             </a:fld>
             <a:endParaRPr lang="en-US">
               <a:solidFill>
@@ -6262,7 +6248,7 @@
           <p:cNvPr id="5" name="Footer Placeholder 4">
             <a:extLst>
               <a:ext uri="{FF2B5EF4-FFF2-40B4-BE49-F238E27FC236}">
-                <a16:creationId xmlns:a16="http://schemas.microsoft.com/office/drawing/2014/main" xmlns="" id="{00CA9A62-84E9-43F7-8571-DC8158A07B91}"/>
+                <a16:creationId xmlns:a16="http://schemas.microsoft.com/office/drawing/2014/main" id="{00CA9A62-84E9-43F7-8571-DC8158A07B91}"/>
               </a:ext>
             </a:extLst>
           </p:cNvPr>
@@ -6312,7 +6298,7 @@
           <p:cNvPr id="6" name="Slide Number Placeholder 5">
             <a:extLst>
               <a:ext uri="{FF2B5EF4-FFF2-40B4-BE49-F238E27FC236}">
-                <a16:creationId xmlns:a16="http://schemas.microsoft.com/office/drawing/2014/main" xmlns="" id="{B23A2010-B6C9-4DCD-A5B0-8870FD49C807}"/>
+                <a16:creationId xmlns:a16="http://schemas.microsoft.com/office/drawing/2014/main" id="{B23A2010-B6C9-4DCD-A5B0-8870FD49C807}"/>
               </a:ext>
             </a:extLst>
           </p:cNvPr>
@@ -6373,7 +6359,7 @@
           <p:cNvPr id="13" name="Group 12">
             <a:extLst>
               <a:ext uri="{FF2B5EF4-FFF2-40B4-BE49-F238E27FC236}">
-                <a16:creationId xmlns:a16="http://schemas.microsoft.com/office/drawing/2014/main" xmlns="" id="{8A32F3C5-2AE1-1C4B-BF1C-DDE044CB1F20}"/>
+                <a16:creationId xmlns:a16="http://schemas.microsoft.com/office/drawing/2014/main" id="{8A32F3C5-2AE1-1C4B-BF1C-DDE044CB1F20}"/>
               </a:ext>
             </a:extLst>
           </p:cNvPr>
@@ -6393,7 +6379,7 @@
             <p:cNvPr id="14" name="Rectangle 13">
               <a:extLst>
                 <a:ext uri="{FF2B5EF4-FFF2-40B4-BE49-F238E27FC236}">
-                  <a16:creationId xmlns:a16="http://schemas.microsoft.com/office/drawing/2014/main" xmlns="" id="{4165B887-B7BE-E44B-ACF6-B6410BBC195F}"/>
+                  <a16:creationId xmlns:a16="http://schemas.microsoft.com/office/drawing/2014/main" id="{4165B887-B7BE-E44B-ACF6-B6410BBC195F}"/>
                 </a:ext>
               </a:extLst>
             </p:cNvPr>
@@ -6449,7 +6435,7 @@
             <p:cNvPr id="15" name="Rectangle 14">
               <a:extLst>
                 <a:ext uri="{FF2B5EF4-FFF2-40B4-BE49-F238E27FC236}">
-                  <a16:creationId xmlns:a16="http://schemas.microsoft.com/office/drawing/2014/main" xmlns="" id="{4F289272-D6E7-FF4A-B70D-6C58C2F8D0E5}"/>
+                  <a16:creationId xmlns:a16="http://schemas.microsoft.com/office/drawing/2014/main" id="{4F289272-D6E7-FF4A-B70D-6C58C2F8D0E5}"/>
                 </a:ext>
               </a:extLst>
             </p:cNvPr>
@@ -6506,7 +6492,7 @@
           <p:cNvPr id="17" name="Group 16">
             <a:extLst>
               <a:ext uri="{FF2B5EF4-FFF2-40B4-BE49-F238E27FC236}">
-                <a16:creationId xmlns:a16="http://schemas.microsoft.com/office/drawing/2014/main" xmlns="" id="{005C9E22-C2DF-BA4E-BD47-390F16575545}"/>
+                <a16:creationId xmlns:a16="http://schemas.microsoft.com/office/drawing/2014/main" id="{005C9E22-C2DF-BA4E-BD47-390F16575545}"/>
               </a:ext>
             </a:extLst>
           </p:cNvPr>
@@ -6526,7 +6512,7 @@
             <p:cNvPr id="18" name="Rectangle 17">
               <a:extLst>
                 <a:ext uri="{FF2B5EF4-FFF2-40B4-BE49-F238E27FC236}">
-                  <a16:creationId xmlns:a16="http://schemas.microsoft.com/office/drawing/2014/main" xmlns="" id="{7ECF6C49-E49D-6B4C-802D-158C7E42597C}"/>
+                  <a16:creationId xmlns:a16="http://schemas.microsoft.com/office/drawing/2014/main" id="{7ECF6C49-E49D-6B4C-802D-158C7E42597C}"/>
                 </a:ext>
               </a:extLst>
             </p:cNvPr>
@@ -6582,7 +6568,7 @@
             <p:cNvPr id="19" name="Rectangle 18">
               <a:extLst>
                 <a:ext uri="{FF2B5EF4-FFF2-40B4-BE49-F238E27FC236}">
-                  <a16:creationId xmlns:a16="http://schemas.microsoft.com/office/drawing/2014/main" xmlns="" id="{149B3AD8-755D-9848-AA8D-F84EDB1A92EA}"/>
+                  <a16:creationId xmlns:a16="http://schemas.microsoft.com/office/drawing/2014/main" id="{149B3AD8-755D-9848-AA8D-F84EDB1A92EA}"/>
                 </a:ext>
               </a:extLst>
             </p:cNvPr>
@@ -7048,10 +7034,9 @@
           <a:lstStyle/>
           <a:p>
             <a:r>
-              <a:rPr lang="he-IL" dirty="0" smtClean="0"/>
+              <a:rPr lang="he-IL" dirty="0"/>
               <a:t>מגישים:</a:t>
             </a:r>
-            <a:endParaRPr lang="he-IL" dirty="0"/>
           </a:p>
         </p:txBody>
       </p:sp>
@@ -7071,20 +7056,15 @@
           <a:lstStyle/>
           <a:p>
             <a:r>
-              <a:rPr lang="he-IL" dirty="0" smtClean="0"/>
+              <a:rPr lang="he-IL" dirty="0"/>
               <a:t>רון פרידמן</a:t>
             </a:r>
           </a:p>
           <a:p>
             <a:r>
-              <a:rPr lang="he-IL" dirty="0" smtClean="0"/>
-              <a:t>נתנאל </a:t>
-            </a:r>
-            <a:r>
-              <a:rPr lang="he-IL" dirty="0" err="1" smtClean="0"/>
-              <a:t>קונפורטי</a:t>
-            </a:r>
-            <a:endParaRPr lang="he-IL" dirty="0"/>
+              <a:rPr lang="he-IL" dirty="0"/>
+              <a:t>נתנאל קונפורטי</a:t>
+            </a:r>
           </a:p>
         </p:txBody>
       </p:sp>
@@ -7097,6 +7077,497 @@
   </p:cSld>
   <p:clrMapOvr>
     <a:overrideClrMapping bg1="lt1" tx1="dk1" bg2="lt2" tx2="dk2" accent1="accent1" accent2="accent2" accent3="accent3" accent4="accent4" accent5="accent5" accent6="accent6" hlink="hlink" folHlink="folHlink"/>
+  </p:clrMapOvr>
+</p:sld>
+</file>
+
+<file path=ppt/slides/slide3.xml><?xml version="1.0" encoding="utf-8"?>
+<p:sld xmlns:a="http://schemas.openxmlformats.org/drawingml/2006/main" xmlns:r="http://schemas.openxmlformats.org/officeDocument/2006/relationships" xmlns:p="http://schemas.openxmlformats.org/presentationml/2006/main">
+  <p:cSld>
+    <p:spTree>
+      <p:nvGrpSpPr>
+        <p:cNvPr id="1" name=""/>
+        <p:cNvGrpSpPr/>
+        <p:nvPr/>
+      </p:nvGrpSpPr>
+      <p:grpSpPr>
+        <a:xfrm>
+          <a:off x="0" y="0"/>
+          <a:ext cx="0" cy="0"/>
+          <a:chOff x="0" y="0"/>
+          <a:chExt cx="0" cy="0"/>
+        </a:xfrm>
+      </p:grpSpPr>
+      <p:sp>
+        <p:nvSpPr>
+          <p:cNvPr id="2" name="כותרת 1">
+            <a:extLst>
+              <a:ext uri="{FF2B5EF4-FFF2-40B4-BE49-F238E27FC236}">
+                <a16:creationId xmlns:a16="http://schemas.microsoft.com/office/drawing/2014/main" id="{7E531E87-BDF3-4A8F-9733-B66E2297D388}"/>
+              </a:ext>
+            </a:extLst>
+          </p:cNvPr>
+          <p:cNvSpPr>
+            <a:spLocks noGrp="1"/>
+          </p:cNvSpPr>
+          <p:nvPr>
+            <p:ph type="title"/>
+          </p:nvPr>
+        </p:nvSpPr>
+        <p:spPr/>
+        <p:txBody>
+          <a:bodyPr/>
+          <a:lstStyle/>
+          <a:p>
+            <a:pPr algn="r" rtl="1"/>
+            <a:r>
+              <a:rPr lang="he-IL" dirty="0"/>
+              <a:t>מטלות</a:t>
+            </a:r>
+          </a:p>
+        </p:txBody>
+      </p:sp>
+      <p:sp>
+        <p:nvSpPr>
+          <p:cNvPr id="3" name="מציין מיקום תוכן 2">
+            <a:extLst>
+              <a:ext uri="{FF2B5EF4-FFF2-40B4-BE49-F238E27FC236}">
+                <a16:creationId xmlns:a16="http://schemas.microsoft.com/office/drawing/2014/main" id="{98E1B9C4-9C46-47A5-B2AF-09CCDA804893}"/>
+              </a:ext>
+            </a:extLst>
+          </p:cNvPr>
+          <p:cNvSpPr>
+            <a:spLocks noGrp="1"/>
+          </p:cNvSpPr>
+          <p:nvPr>
+            <p:ph idx="1"/>
+          </p:nvPr>
+        </p:nvSpPr>
+        <p:spPr>
+          <a:xfrm>
+            <a:off x="838200" y="1456656"/>
+            <a:ext cx="10515600" cy="4351338"/>
+          </a:xfrm>
+        </p:spPr>
+        <p:txBody>
+          <a:bodyPr/>
+          <a:lstStyle/>
+          <a:p>
+            <a:pPr algn="r" rtl="1"/>
+            <a:r>
+              <a:rPr lang="he-IL" dirty="0"/>
+              <a:t>רשת שרת-לקוח</a:t>
+            </a:r>
+          </a:p>
+          <a:p>
+            <a:pPr algn="r" rtl="1"/>
+            <a:r>
+              <a:rPr lang="he-IL" dirty="0"/>
+              <a:t>שרת מחזיק את כל </a:t>
+            </a:r>
+            <a:r>
+              <a:rPr lang="he-IL" dirty="0" err="1"/>
+              <a:t>הבלוקצ'יין</a:t>
+            </a:r>
+            <a:r>
+              <a:rPr lang="en-US" dirty="0"/>
+              <a:t>	</a:t>
+            </a:r>
+            <a:endParaRPr lang="he-IL" dirty="0"/>
+          </a:p>
+          <a:p>
+            <a:pPr algn="r" rtl="1"/>
+            <a:r>
+              <a:rPr lang="he-IL" dirty="0"/>
+              <a:t>לקוח יכול לבצע פעולות מול השרת</a:t>
+            </a:r>
+          </a:p>
+          <a:p>
+            <a:pPr lvl="1" algn="r" rtl="1"/>
+            <a:r>
+              <a:rPr lang="he-IL" dirty="0"/>
+              <a:t>הוספת </a:t>
+            </a:r>
+            <a:r>
+              <a:rPr lang="he-IL" dirty="0" err="1"/>
+              <a:t>טרנזקציה</a:t>
+            </a:r>
+            <a:endParaRPr lang="he-IL" dirty="0"/>
+          </a:p>
+          <a:p>
+            <a:pPr lvl="1" algn="r" rtl="1"/>
+            <a:r>
+              <a:rPr lang="he-IL" dirty="0"/>
+              <a:t>לוודא </a:t>
+            </a:r>
+            <a:r>
+              <a:rPr lang="he-IL" dirty="0" err="1"/>
+              <a:t>שטרנזקציה</a:t>
+            </a:r>
+            <a:r>
+              <a:rPr lang="he-IL" dirty="0"/>
+              <a:t> נמצאת </a:t>
+            </a:r>
+            <a:r>
+              <a:rPr lang="he-IL" dirty="0" err="1"/>
+              <a:t>בבלוקצ'יין</a:t>
+            </a:r>
+            <a:endParaRPr lang="he-IL" dirty="0"/>
+          </a:p>
+          <a:p>
+            <a:pPr lvl="1" algn="r" rtl="1"/>
+            <a:r>
+              <a:rPr lang="he-IL" dirty="0"/>
+              <a:t>לקבל את ה </a:t>
+            </a:r>
+            <a:r>
+              <a:rPr lang="en-US" dirty="0"/>
+              <a:t> Balance</a:t>
+            </a:r>
+            <a:r>
+              <a:rPr lang="he-IL" dirty="0"/>
+              <a:t>שלו</a:t>
+            </a:r>
+          </a:p>
+          <a:p>
+            <a:pPr algn="r" rtl="1"/>
+            <a:r>
+              <a:rPr lang="he-IL" dirty="0" err="1"/>
+              <a:t>בלוקצ'יין</a:t>
+            </a:r>
+            <a:r>
+              <a:rPr lang="he-IL" dirty="0"/>
+              <a:t> עם עסקאות שנטענות בהעלאת השרת</a:t>
+            </a:r>
+          </a:p>
+          <a:p>
+            <a:pPr algn="r" rtl="1"/>
+            <a:r>
+              <a:rPr lang="he-IL" dirty="0"/>
+              <a:t>לכל בלוק יש עץ מרקל ו</a:t>
+            </a:r>
+            <a:r>
+              <a:rPr lang="en-US" dirty="0" err="1"/>
+              <a:t>BloomFilter</a:t>
+            </a:r>
+            <a:endParaRPr lang="he-IL" dirty="0"/>
+          </a:p>
+          <a:p>
+            <a:pPr algn="r" rtl="1"/>
+            <a:r>
+              <a:rPr lang="he-IL" dirty="0"/>
+              <a:t>לא מומש - </a:t>
+            </a:r>
+            <a:r>
+              <a:rPr lang="en-US" dirty="0"/>
+              <a:t>Segregate Witness</a:t>
+            </a:r>
+            <a:endParaRPr lang="he-IL" dirty="0"/>
+          </a:p>
+          <a:p>
+            <a:pPr algn="r" rtl="1"/>
+            <a:endParaRPr lang="he-IL" dirty="0"/>
+          </a:p>
+          <a:p>
+            <a:pPr algn="r" rtl="1"/>
+            <a:endParaRPr lang="he-IL" dirty="0"/>
+          </a:p>
+          <a:p>
+            <a:pPr algn="r" rtl="1"/>
+            <a:endParaRPr lang="he-IL" dirty="0"/>
+          </a:p>
+        </p:txBody>
+      </p:sp>
+      <p:sp>
+        <p:nvSpPr>
+          <p:cNvPr id="4" name="מציין מיקום של מספר שקופית 3">
+            <a:extLst>
+              <a:ext uri="{FF2B5EF4-FFF2-40B4-BE49-F238E27FC236}">
+                <a16:creationId xmlns:a16="http://schemas.microsoft.com/office/drawing/2014/main" id="{C18A00C3-668C-41CB-BEB0-FD2D8704ADD2}"/>
+              </a:ext>
+            </a:extLst>
+          </p:cNvPr>
+          <p:cNvSpPr>
+            <a:spLocks noGrp="1"/>
+          </p:cNvSpPr>
+          <p:nvPr>
+            <p:ph type="sldNum" sz="quarter" idx="12"/>
+          </p:nvPr>
+        </p:nvSpPr>
+        <p:spPr/>
+        <p:txBody>
+          <a:bodyPr/>
+          <a:lstStyle/>
+          <a:p>
+            <a:fld id="{87D66184-88C7-4959-892D-5713FEA05296}" type="slidenum">
+              <a:rPr lang="en-US" smtClean="0">
+                <a:solidFill>
+                  <a:srgbClr val="000000"/>
+                </a:solidFill>
+              </a:rPr>
+              <a:pPr/>
+              <a:t>3</a:t>
+            </a:fld>
+            <a:endParaRPr lang="en-US">
+              <a:solidFill>
+                <a:srgbClr val="000000"/>
+              </a:solidFill>
+            </a:endParaRPr>
+          </a:p>
+        </p:txBody>
+      </p:sp>
+    </p:spTree>
+    <p:extLst>
+      <p:ext uri="{BB962C8B-B14F-4D97-AF65-F5344CB8AC3E}">
+        <p14:creationId xmlns:p14="http://schemas.microsoft.com/office/powerpoint/2010/main" val="1783065066"/>
+      </p:ext>
+    </p:extLst>
+  </p:cSld>
+  <p:clrMapOvr>
+    <a:masterClrMapping/>
+  </p:clrMapOvr>
+</p:sld>
+</file>
+
+<file path=ppt/slides/slide4.xml><?xml version="1.0" encoding="utf-8"?>
+<p:sld xmlns:a="http://schemas.openxmlformats.org/drawingml/2006/main" xmlns:r="http://schemas.openxmlformats.org/officeDocument/2006/relationships" xmlns:p="http://schemas.openxmlformats.org/presentationml/2006/main">
+  <p:cSld>
+    <p:spTree>
+      <p:nvGrpSpPr>
+        <p:cNvPr id="1" name=""/>
+        <p:cNvGrpSpPr/>
+        <p:nvPr/>
+      </p:nvGrpSpPr>
+      <p:grpSpPr>
+        <a:xfrm>
+          <a:off x="0" y="0"/>
+          <a:ext cx="0" cy="0"/>
+          <a:chOff x="0" y="0"/>
+          <a:chExt cx="0" cy="0"/>
+        </a:xfrm>
+      </p:grpSpPr>
+      <p:sp>
+        <p:nvSpPr>
+          <p:cNvPr id="2" name="כותרת 1">
+            <a:extLst>
+              <a:ext uri="{FF2B5EF4-FFF2-40B4-BE49-F238E27FC236}">
+                <a16:creationId xmlns:a16="http://schemas.microsoft.com/office/drawing/2014/main" id="{F8FD3D7E-1630-4CD3-B3BF-8E7F74E3D2FC}"/>
+              </a:ext>
+            </a:extLst>
+          </p:cNvPr>
+          <p:cNvSpPr>
+            <a:spLocks noGrp="1"/>
+          </p:cNvSpPr>
+          <p:nvPr>
+            <p:ph type="title"/>
+          </p:nvPr>
+        </p:nvSpPr>
+        <p:spPr/>
+        <p:txBody>
+          <a:bodyPr/>
+          <a:lstStyle/>
+          <a:p>
+            <a:pPr algn="r" rtl="1"/>
+            <a:r>
+              <a:rPr lang="he-IL" dirty="0"/>
+              <a:t>הוראות התקנה והפעלה</a:t>
+            </a:r>
+          </a:p>
+        </p:txBody>
+      </p:sp>
+      <p:sp>
+        <p:nvSpPr>
+          <p:cNvPr id="3" name="מציין מיקום תוכן 2">
+            <a:extLst>
+              <a:ext uri="{FF2B5EF4-FFF2-40B4-BE49-F238E27FC236}">
+                <a16:creationId xmlns:a16="http://schemas.microsoft.com/office/drawing/2014/main" id="{BE43ACAD-63F7-4B00-9A72-484A1B58ED49}"/>
+              </a:ext>
+            </a:extLst>
+          </p:cNvPr>
+          <p:cNvSpPr>
+            <a:spLocks noGrp="1"/>
+          </p:cNvSpPr>
+          <p:nvPr>
+            <p:ph idx="1"/>
+          </p:nvPr>
+        </p:nvSpPr>
+        <p:spPr/>
+        <p:txBody>
+          <a:bodyPr/>
+          <a:lstStyle/>
+          <a:p>
+            <a:pPr algn="r" rtl="1"/>
+            <a:r>
+              <a:rPr lang="he-IL" dirty="0"/>
+              <a:t>נכנסים לתיקייה הראשית </a:t>
+            </a:r>
+            <a:r>
+              <a:rPr lang="he-IL" dirty="0" err="1"/>
+              <a:t>וב</a:t>
+            </a:r>
+            <a:r>
+              <a:rPr lang="en-US" dirty="0" err="1"/>
+              <a:t>cmd</a:t>
+            </a:r>
+            <a:r>
+              <a:rPr lang="he-IL" dirty="0"/>
+              <a:t> כותבים: </a:t>
+            </a:r>
+            <a:r>
+              <a:rPr lang="en-US" dirty="0" err="1"/>
+              <a:t>npm</a:t>
+            </a:r>
+            <a:r>
+              <a:rPr lang="en-US" dirty="0"/>
+              <a:t> install</a:t>
+            </a:r>
+          </a:p>
+          <a:p>
+            <a:pPr lvl="1" algn="r" rtl="1"/>
+            <a:r>
+              <a:rPr lang="he-IL" dirty="0"/>
+              <a:t>לוחצים </a:t>
+            </a:r>
+            <a:r>
+              <a:rPr lang="he-IL" dirty="0" err="1"/>
+              <a:t>אנטר</a:t>
+            </a:r>
+            <a:r>
+              <a:rPr lang="he-IL" dirty="0"/>
+              <a:t> ומתקינים את החבילות</a:t>
+            </a:r>
+          </a:p>
+          <a:p>
+            <a:pPr algn="r" rtl="1"/>
+            <a:r>
+              <a:rPr lang="he-IL" dirty="0"/>
+              <a:t>נכנסים לתיקייה </a:t>
+            </a:r>
+            <a:r>
+              <a:rPr lang="en-US" dirty="0"/>
+              <a:t>Assignment/</a:t>
+            </a:r>
+            <a:r>
+              <a:rPr lang="en-US" dirty="0" err="1"/>
+              <a:t>src</a:t>
+            </a:r>
+            <a:r>
+              <a:rPr lang="he-IL" dirty="0"/>
+              <a:t> </a:t>
+            </a:r>
+          </a:p>
+          <a:p>
+            <a:pPr algn="r" rtl="1"/>
+            <a:r>
+              <a:rPr lang="he-IL" dirty="0"/>
+              <a:t>מפעילים את הקליינט והסרבר דרך ה</a:t>
+            </a:r>
+            <a:r>
+              <a:rPr lang="en-US" dirty="0"/>
+              <a:t>CMD</a:t>
+            </a:r>
+            <a:r>
+              <a:rPr lang="he-IL" dirty="0"/>
+              <a:t> (כמובן בשני </a:t>
+            </a:r>
+            <a:r>
+              <a:rPr lang="en-US" dirty="0"/>
+              <a:t>CMD</a:t>
+            </a:r>
+            <a:r>
+              <a:rPr lang="he-IL" dirty="0"/>
+              <a:t> שונים):</a:t>
+            </a:r>
+          </a:p>
+          <a:p>
+            <a:pPr lvl="1" algn="r" rtl="1"/>
+            <a:r>
+              <a:rPr lang="en-US" dirty="0"/>
+              <a:t>node client 30001 30000</a:t>
+            </a:r>
+            <a:endParaRPr lang="he-IL" dirty="0"/>
+          </a:p>
+          <a:p>
+            <a:pPr lvl="1" algn="r" rtl="1"/>
+            <a:r>
+              <a:rPr lang="en-US" dirty="0"/>
+              <a:t>node server ../resource/</a:t>
+            </a:r>
+            <a:r>
+              <a:rPr lang="en-US" dirty="0" err="1"/>
+              <a:t>initial.json</a:t>
+            </a:r>
+            <a:r>
+              <a:rPr lang="en-US" dirty="0"/>
+              <a:t> 30000 30001</a:t>
+            </a:r>
+            <a:endParaRPr lang="he-IL" dirty="0"/>
+          </a:p>
+          <a:p>
+            <a:pPr algn="r" rtl="1"/>
+            <a:r>
+              <a:rPr lang="he-IL" dirty="0"/>
+              <a:t>עכשיו ניתן לבצע פעולות עם ה</a:t>
+            </a:r>
+            <a:r>
+              <a:rPr lang="en-US"/>
+              <a:t>Client</a:t>
+            </a:r>
+            <a:endParaRPr lang="he-IL" dirty="0"/>
+          </a:p>
+          <a:p>
+            <a:pPr algn="r" rtl="1"/>
+            <a:endParaRPr lang="he-IL" dirty="0"/>
+          </a:p>
+        </p:txBody>
+      </p:sp>
+      <p:sp>
+        <p:nvSpPr>
+          <p:cNvPr id="4" name="מציין מיקום של מספר שקופית 3">
+            <a:extLst>
+              <a:ext uri="{FF2B5EF4-FFF2-40B4-BE49-F238E27FC236}">
+                <a16:creationId xmlns:a16="http://schemas.microsoft.com/office/drawing/2014/main" id="{61A2AF0E-CDC0-459F-8912-4DEF3B74C541}"/>
+              </a:ext>
+            </a:extLst>
+          </p:cNvPr>
+          <p:cNvSpPr>
+            <a:spLocks noGrp="1"/>
+          </p:cNvSpPr>
+          <p:nvPr>
+            <p:ph type="sldNum" sz="quarter" idx="12"/>
+          </p:nvPr>
+        </p:nvSpPr>
+        <p:spPr/>
+        <p:txBody>
+          <a:bodyPr/>
+          <a:lstStyle/>
+          <a:p>
+            <a:fld id="{87D66184-88C7-4959-892D-5713FEA05296}" type="slidenum">
+              <a:rPr lang="en-US" smtClean="0">
+                <a:solidFill>
+                  <a:srgbClr val="000000"/>
+                </a:solidFill>
+              </a:rPr>
+              <a:pPr/>
+              <a:t>4</a:t>
+            </a:fld>
+            <a:endParaRPr lang="en-US">
+              <a:solidFill>
+                <a:srgbClr val="000000"/>
+              </a:solidFill>
+            </a:endParaRPr>
+          </a:p>
+        </p:txBody>
+      </p:sp>
+    </p:spTree>
+    <p:extLst>
+      <p:ext uri="{BB962C8B-B14F-4D97-AF65-F5344CB8AC3E}">
+        <p14:creationId xmlns:p14="http://schemas.microsoft.com/office/powerpoint/2010/main" val="1398475784"/>
+      </p:ext>
+    </p:extLst>
+  </p:cSld>
+  <p:clrMapOvr>
+    <a:masterClrMapping/>
   </p:clrMapOvr>
 </p:sld>
 </file>

</xml_diff>

<commit_message>
fixed find hash in blockchain class. now validate works. removed unnecessary parseint
</commit_message>
<xml_diff>
--- a/Assignment1/Docs/Pres.pptx
+++ b/Assignment1/Docs/Pres.pptx
@@ -245,7 +245,7 @@
           <a:p>
             <a:fld id="{022F9609-C2A5-48F5-93C6-285E682E4BDE}" type="datetimeFigureOut">
               <a:rPr lang="he-IL" smtClean="0"/>
-              <a:t>כ'/ניסן/תשע"ט</a:t>
+              <a:t>כ"ב/ניסן/תשע"ט</a:t>
             </a:fld>
             <a:endParaRPr lang="he-IL"/>
           </a:p>
@@ -413,7 +413,7 @@
           <a:p>
             <a:fld id="{022F9609-C2A5-48F5-93C6-285E682E4BDE}" type="datetimeFigureOut">
               <a:rPr lang="he-IL" smtClean="0"/>
-              <a:t>כ'/ניסן/תשע"ט</a:t>
+              <a:t>כ"ב/ניסן/תשע"ט</a:t>
             </a:fld>
             <a:endParaRPr lang="he-IL"/>
           </a:p>
@@ -591,7 +591,7 @@
           <a:p>
             <a:fld id="{022F9609-C2A5-48F5-93C6-285E682E4BDE}" type="datetimeFigureOut">
               <a:rPr lang="he-IL" smtClean="0"/>
-              <a:t>כ'/ניסן/תשע"ט</a:t>
+              <a:t>כ"ב/ניסן/תשע"ט</a:t>
             </a:fld>
             <a:endParaRPr lang="he-IL"/>
           </a:p>
@@ -806,7 +806,7 @@
                 </a:solidFill>
               </a:rPr>
               <a:pPr/>
-              <a:t>4/25/2019</a:t>
+              <a:t>4/27/2019</a:t>
             </a:fld>
             <a:endParaRPr lang="en-US">
               <a:solidFill>
@@ -1074,7 +1074,7 @@
                 </a:solidFill>
               </a:rPr>
               <a:pPr/>
-              <a:t>4/25/2019</a:t>
+              <a:t>4/27/2019</a:t>
             </a:fld>
             <a:endParaRPr lang="en-US">
               <a:solidFill>
@@ -1390,7 +1390,7 @@
                 </a:solidFill>
               </a:rPr>
               <a:pPr/>
-              <a:t>4/25/2019</a:t>
+              <a:t>4/27/2019</a:t>
             </a:fld>
             <a:endParaRPr lang="en-US">
               <a:solidFill>
@@ -1687,7 +1687,7 @@
                 </a:solidFill>
               </a:rPr>
               <a:pPr/>
-              <a:t>4/25/2019</a:t>
+              <a:t>4/27/2019</a:t>
             </a:fld>
             <a:endParaRPr lang="en-US">
               <a:solidFill>
@@ -2131,7 +2131,7 @@
                 </a:solidFill>
               </a:rPr>
               <a:pPr/>
-              <a:t>4/25/2019</a:t>
+              <a:t>4/27/2019</a:t>
             </a:fld>
             <a:endParaRPr lang="en-US">
               <a:solidFill>
@@ -2304,7 +2304,7 @@
                 </a:solidFill>
               </a:rPr>
               <a:pPr/>
-              <a:t>4/25/2019</a:t>
+              <a:t>4/27/2019</a:t>
             </a:fld>
             <a:endParaRPr lang="en-US">
               <a:solidFill>
@@ -2449,7 +2449,7 @@
                 </a:solidFill>
               </a:rPr>
               <a:pPr/>
-              <a:t>4/25/2019</a:t>
+              <a:t>4/27/2019</a:t>
             </a:fld>
             <a:endParaRPr lang="en-US">
               <a:solidFill>
@@ -2792,7 +2792,7 @@
                 </a:solidFill>
               </a:rPr>
               <a:pPr/>
-              <a:t>4/25/2019</a:t>
+              <a:t>4/27/2019</a:t>
             </a:fld>
             <a:endParaRPr lang="en-US">
               <a:solidFill>
@@ -2997,7 +2997,7 @@
           <a:p>
             <a:fld id="{022F9609-C2A5-48F5-93C6-285E682E4BDE}" type="datetimeFigureOut">
               <a:rPr lang="he-IL" smtClean="0"/>
-              <a:t>כ'/ניסן/תשע"ט</a:t>
+              <a:t>כ"ב/ניסן/תשע"ט</a:t>
             </a:fld>
             <a:endParaRPr lang="he-IL"/>
           </a:p>
@@ -3280,7 +3280,7 @@
                 </a:solidFill>
               </a:rPr>
               <a:pPr/>
-              <a:t>4/25/2019</a:t>
+              <a:t>4/27/2019</a:t>
             </a:fld>
             <a:endParaRPr lang="en-US">
               <a:solidFill>
@@ -3510,7 +3510,7 @@
                 </a:solidFill>
               </a:rPr>
               <a:pPr/>
-              <a:t>4/25/2019</a:t>
+              <a:t>4/27/2019</a:t>
             </a:fld>
             <a:endParaRPr lang="en-US">
               <a:solidFill>
@@ -3750,7 +3750,7 @@
                 </a:solidFill>
               </a:rPr>
               <a:pPr/>
-              <a:t>4/25/2019</a:t>
+              <a:t>4/27/2019</a:t>
             </a:fld>
             <a:endParaRPr lang="en-US">
               <a:solidFill>
@@ -4032,7 +4032,7 @@
           <a:p>
             <a:fld id="{022F9609-C2A5-48F5-93C6-285E682E4BDE}" type="datetimeFigureOut">
               <a:rPr lang="he-IL" smtClean="0"/>
-              <a:t>כ'/ניסן/תשע"ט</a:t>
+              <a:t>כ"ב/ניסן/תשע"ט</a:t>
             </a:fld>
             <a:endParaRPr lang="he-IL"/>
           </a:p>
@@ -4261,7 +4261,7 @@
           <a:p>
             <a:fld id="{022F9609-C2A5-48F5-93C6-285E682E4BDE}" type="datetimeFigureOut">
               <a:rPr lang="he-IL" smtClean="0"/>
-              <a:t>כ'/ניסן/תשע"ט</a:t>
+              <a:t>כ"ב/ניסן/תשע"ט</a:t>
             </a:fld>
             <a:endParaRPr lang="he-IL"/>
           </a:p>
@@ -4625,7 +4625,7 @@
           <a:p>
             <a:fld id="{022F9609-C2A5-48F5-93C6-285E682E4BDE}" type="datetimeFigureOut">
               <a:rPr lang="he-IL" smtClean="0"/>
-              <a:t>כ'/ניסן/תשע"ט</a:t>
+              <a:t>כ"ב/ניסן/תשע"ט</a:t>
             </a:fld>
             <a:endParaRPr lang="he-IL"/>
           </a:p>
@@ -4742,7 +4742,7 @@
           <a:p>
             <a:fld id="{022F9609-C2A5-48F5-93C6-285E682E4BDE}" type="datetimeFigureOut">
               <a:rPr lang="he-IL" smtClean="0"/>
-              <a:t>כ'/ניסן/תשע"ט</a:t>
+              <a:t>כ"ב/ניסן/תשע"ט</a:t>
             </a:fld>
             <a:endParaRPr lang="he-IL"/>
           </a:p>
@@ -4837,7 +4837,7 @@
           <a:p>
             <a:fld id="{022F9609-C2A5-48F5-93C6-285E682E4BDE}" type="datetimeFigureOut">
               <a:rPr lang="he-IL" smtClean="0"/>
-              <a:t>כ'/ניסן/תשע"ט</a:t>
+              <a:t>כ"ב/ניסן/תשע"ט</a:t>
             </a:fld>
             <a:endParaRPr lang="he-IL"/>
           </a:p>
@@ -5112,7 +5112,7 @@
           <a:p>
             <a:fld id="{022F9609-C2A5-48F5-93C6-285E682E4BDE}" type="datetimeFigureOut">
               <a:rPr lang="he-IL" smtClean="0"/>
-              <a:t>כ'/ניסן/תשע"ט</a:t>
+              <a:t>כ"ב/ניסן/תשע"ט</a:t>
             </a:fld>
             <a:endParaRPr lang="he-IL"/>
           </a:p>
@@ -5364,7 +5364,7 @@
           <a:p>
             <a:fld id="{022F9609-C2A5-48F5-93C6-285E682E4BDE}" type="datetimeFigureOut">
               <a:rPr lang="he-IL" smtClean="0"/>
-              <a:t>כ'/ניסן/תשע"ט</a:t>
+              <a:t>כ"ב/ניסן/תשע"ט</a:t>
             </a:fld>
             <a:endParaRPr lang="he-IL"/>
           </a:p>
@@ -5575,7 +5575,7 @@
           <a:p>
             <a:fld id="{022F9609-C2A5-48F5-93C6-285E682E4BDE}" type="datetimeFigureOut">
               <a:rPr lang="he-IL" smtClean="0"/>
-              <a:t>כ'/ניסן/תשע"ט</a:t>
+              <a:t>כ"ב/ניסן/תשע"ט</a:t>
             </a:fld>
             <a:endParaRPr lang="he-IL"/>
           </a:p>
@@ -6231,7 +6231,7 @@
                 </a:solidFill>
               </a:rPr>
               <a:pPr rtl="0"/>
-              <a:t>4/25/2019</a:t>
+              <a:t>4/27/2019</a:t>
             </a:fld>
             <a:endParaRPr lang="en-US">
               <a:solidFill>
@@ -7495,7 +7495,7 @@
             </a:r>
             <a:r>
               <a:rPr lang="en-US" dirty="0" err="1"/>
-              <a:t>initial.json</a:t>
+              <a:t>initialBlocks.json</a:t>
             </a:r>
             <a:r>
               <a:rPr lang="en-US" dirty="0"/>
@@ -7510,7 +7510,7 @@
               <a:t>עכשיו ניתן לבצע פעולות עם ה</a:t>
             </a:r>
             <a:r>
-              <a:rPr lang="en-US"/>
+              <a:rPr lang="en-US" dirty="0"/>
               <a:t>Client</a:t>
             </a:r>
             <a:endParaRPr lang="he-IL" dirty="0"/>

</xml_diff>